<commit_message>
added creating access key removed
</commit_message>
<xml_diff>
--- a/screenshots/goback.pptx
+++ b/screenshots/goback.pptx
@@ -6,6 +6,8 @@
   </p:sldMasterIdLst>
   <p:sldIdLst>
     <p:sldId id="256" r:id="rId2"/>
+    <p:sldId id="257" r:id="rId3"/>
+    <p:sldId id="258" r:id="rId4"/>
   </p:sldIdLst>
   <p:sldSz cx="12192000" cy="6858000"/>
   <p:notesSz cx="6858000" cy="9144000"/>
@@ -2964,234 +2966,265 @@
           <a:chExt cx="0" cy="0"/>
         </a:xfrm>
       </p:grpSpPr>
-      <p:pic>
-        <p:nvPicPr>
-          <p:cNvPr id="1026" name="Picture 2" descr="https://golang.org/doc/gopher/gopherbw.png"/>
-          <p:cNvPicPr>
-            <a:picLocks noChangeAspect="1" noChangeArrowheads="1"/>
-          </p:cNvPicPr>
-          <p:nvPr/>
-        </p:nvPicPr>
-        <p:blipFill>
-          <a:blip r:embed="rId2" cstate="print">
-            <a:extLst>
-              <a:ext uri="{28A0092B-C50C-407E-A947-70E740481C1C}">
-                <a14:useLocalDpi xmlns:a14="http://schemas.microsoft.com/office/drawing/2010/main" val="0"/>
-              </a:ext>
-            </a:extLst>
-          </a:blip>
-          <a:srcRect/>
-          <a:stretch>
-            <a:fillRect/>
-          </a:stretch>
-        </p:blipFill>
-        <p:spPr bwMode="auto">
-          <a:xfrm>
-            <a:off x="783771" y="725715"/>
-            <a:ext cx="5842000" cy="5842000"/>
-          </a:xfrm>
-          <a:prstGeom prst="rect">
-            <a:avLst/>
-          </a:prstGeom>
-          <a:noFill/>
-          <a:extLst>
-            <a:ext uri="{909E8E84-426E-40DD-AFC4-6F175D3DCCD1}">
-              <a14:hiddenFill xmlns:a14="http://schemas.microsoft.com/office/drawing/2010/main">
-                <a:solidFill>
-                  <a:srgbClr val="FFFFFF"/>
-                </a:solidFill>
-              </a14:hiddenFill>
-            </a:ext>
-          </a:extLst>
-        </p:spPr>
-      </p:pic>
       <p:grpSp>
         <p:nvGrpSpPr>
-          <p:cNvPr id="5" name="그룹 4"/>
+          <p:cNvPr id="3" name="그룹 2"/>
           <p:cNvGrpSpPr/>
           <p:nvPr/>
         </p:nvGrpSpPr>
         <p:grpSpPr>
-          <a:xfrm rot="19639182">
-            <a:off x="4768177" y="2051761"/>
-            <a:ext cx="1795763" cy="2099884"/>
-            <a:chOff x="5950857" y="1611086"/>
-            <a:chExt cx="1611086" cy="1578429"/>
+          <a:xfrm>
+            <a:off x="783771" y="725715"/>
+            <a:ext cx="6072433" cy="5842000"/>
+            <a:chOff x="783771" y="725715"/>
+            <a:chExt cx="6072433" cy="5842000"/>
           </a:xfrm>
-          <a:solidFill>
-            <a:srgbClr val="F8C034"/>
-          </a:solidFill>
         </p:grpSpPr>
+        <p:pic>
+          <p:nvPicPr>
+            <p:cNvPr id="1026" name="Picture 2" descr="https://golang.org/doc/gopher/gopherbw.png"/>
+            <p:cNvPicPr>
+              <a:picLocks noChangeAspect="1" noChangeArrowheads="1"/>
+            </p:cNvPicPr>
+            <p:nvPr/>
+          </p:nvPicPr>
+          <p:blipFill>
+            <a:blip r:embed="rId2" cstate="print">
+              <a:extLst>
+                <a:ext uri="{28A0092B-C50C-407E-A947-70E740481C1C}">
+                  <a14:useLocalDpi xmlns:a14="http://schemas.microsoft.com/office/drawing/2010/main" val="0"/>
+                </a:ext>
+              </a:extLst>
+            </a:blip>
+            <a:srcRect/>
+            <a:stretch>
+              <a:fillRect/>
+            </a:stretch>
+          </p:blipFill>
+          <p:spPr bwMode="auto">
+            <a:xfrm>
+              <a:off x="783771" y="725715"/>
+              <a:ext cx="5842000" cy="5842000"/>
+            </a:xfrm>
+            <a:prstGeom prst="rect">
+              <a:avLst/>
+            </a:prstGeom>
+            <a:noFill/>
+            <a:extLst>
+              <a:ext uri="{909E8E84-426E-40DD-AFC4-6F175D3DCCD1}">
+                <a14:hiddenFill xmlns:a14="http://schemas.microsoft.com/office/drawing/2010/main">
+                  <a:solidFill>
+                    <a:srgbClr val="FFFFFF"/>
+                  </a:solidFill>
+                </a14:hiddenFill>
+              </a:ext>
+            </a:extLst>
+          </p:spPr>
+        </p:pic>
+        <p:grpSp>
+          <p:nvGrpSpPr>
+            <p:cNvPr id="5" name="그룹 4"/>
+            <p:cNvGrpSpPr/>
+            <p:nvPr/>
+          </p:nvGrpSpPr>
+          <p:grpSpPr>
+            <a:xfrm rot="19639182">
+              <a:off x="4768177" y="2051761"/>
+              <a:ext cx="1795763" cy="2099884"/>
+              <a:chOff x="5950857" y="1611086"/>
+              <a:chExt cx="1611086" cy="1578429"/>
+            </a:xfrm>
+            <a:solidFill>
+              <a:srgbClr val="F8C034"/>
+            </a:solidFill>
+          </p:grpSpPr>
+          <p:sp>
+            <p:nvSpPr>
+              <p:cNvPr id="8" name="순서도: 자기 디스크 7"/>
+              <p:cNvSpPr/>
+              <p:nvPr/>
+            </p:nvSpPr>
+            <p:spPr>
+              <a:xfrm>
+                <a:off x="5950857" y="2507344"/>
+                <a:ext cx="1611086" cy="682171"/>
+              </a:xfrm>
+              <a:prstGeom prst="flowChartMagneticDisk">
+                <a:avLst/>
+              </a:prstGeom>
+              <a:solidFill>
+                <a:srgbClr val="00B050"/>
+              </a:solidFill>
+              <a:ln w="28575">
+                <a:solidFill>
+                  <a:srgbClr val="002060"/>
+                </a:solidFill>
+              </a:ln>
+            </p:spPr>
+            <p:style>
+              <a:lnRef idx="2">
+                <a:schemeClr val="accent1">
+                  <a:shade val="50000"/>
+                </a:schemeClr>
+              </a:lnRef>
+              <a:fillRef idx="1">
+                <a:schemeClr val="accent1"/>
+              </a:fillRef>
+              <a:effectRef idx="0">
+                <a:schemeClr val="accent1"/>
+              </a:effectRef>
+              <a:fontRef idx="minor">
+                <a:schemeClr val="lt1"/>
+              </a:fontRef>
+            </p:style>
+            <p:txBody>
+              <a:bodyPr rtlCol="0" anchor="ctr"/>
+              <a:lstStyle/>
+              <a:p>
+                <a:pPr algn="ctr"/>
+                <a:endParaRPr lang="ko-KR" altLang="en-US"/>
+              </a:p>
+            </p:txBody>
+          </p:sp>
+          <p:sp>
+            <p:nvSpPr>
+              <p:cNvPr id="6" name="순서도: 자기 디스크 5"/>
+              <p:cNvSpPr/>
+              <p:nvPr/>
+            </p:nvSpPr>
+            <p:spPr>
+              <a:xfrm>
+                <a:off x="5950857" y="2053773"/>
+                <a:ext cx="1611086" cy="682171"/>
+              </a:xfrm>
+              <a:prstGeom prst="flowChartMagneticDisk">
+                <a:avLst/>
+              </a:prstGeom>
+              <a:solidFill>
+                <a:srgbClr val="FFFF00"/>
+              </a:solidFill>
+              <a:ln w="28575">
+                <a:solidFill>
+                  <a:srgbClr val="002060"/>
+                </a:solidFill>
+              </a:ln>
+            </p:spPr>
+            <p:style>
+              <a:lnRef idx="2">
+                <a:schemeClr val="accent1">
+                  <a:shade val="50000"/>
+                </a:schemeClr>
+              </a:lnRef>
+              <a:fillRef idx="1">
+                <a:schemeClr val="accent1"/>
+              </a:fillRef>
+              <a:effectRef idx="0">
+                <a:schemeClr val="accent1"/>
+              </a:effectRef>
+              <a:fontRef idx="minor">
+                <a:schemeClr val="lt1"/>
+              </a:fontRef>
+            </p:style>
+            <p:txBody>
+              <a:bodyPr rtlCol="0" anchor="ctr"/>
+              <a:lstStyle/>
+              <a:p>
+                <a:pPr algn="ctr"/>
+                <a:endParaRPr lang="ko-KR" altLang="en-US"/>
+              </a:p>
+            </p:txBody>
+          </p:sp>
+          <p:sp>
+            <p:nvSpPr>
+              <p:cNvPr id="4" name="순서도: 자기 디스크 3"/>
+              <p:cNvSpPr/>
+              <p:nvPr/>
+            </p:nvSpPr>
+            <p:spPr>
+              <a:xfrm>
+                <a:off x="5950857" y="1611086"/>
+                <a:ext cx="1611086" cy="682171"/>
+              </a:xfrm>
+              <a:prstGeom prst="flowChartMagneticDisk">
+                <a:avLst/>
+              </a:prstGeom>
+              <a:solidFill>
+                <a:srgbClr val="FF0000"/>
+              </a:solidFill>
+              <a:ln w="28575">
+                <a:solidFill>
+                  <a:srgbClr val="002060"/>
+                </a:solidFill>
+              </a:ln>
+            </p:spPr>
+            <p:style>
+              <a:lnRef idx="2">
+                <a:schemeClr val="accent1">
+                  <a:shade val="50000"/>
+                </a:schemeClr>
+              </a:lnRef>
+              <a:fillRef idx="1">
+                <a:schemeClr val="accent1"/>
+              </a:fillRef>
+              <a:effectRef idx="0">
+                <a:schemeClr val="accent1"/>
+              </a:effectRef>
+              <a:fontRef idx="minor">
+                <a:schemeClr val="lt1"/>
+              </a:fontRef>
+            </p:style>
+            <p:txBody>
+              <a:bodyPr rtlCol="0" anchor="ctr"/>
+              <a:lstStyle/>
+              <a:p>
+                <a:pPr algn="ctr"/>
+                <a:endParaRPr lang="ko-KR" altLang="en-US"/>
+              </a:p>
+            </p:txBody>
+          </p:sp>
+        </p:grpSp>
         <p:sp>
           <p:nvSpPr>
-            <p:cNvPr id="8" name="순서도: 자기 디스크 7"/>
+            <p:cNvPr id="9" name="직사각형 8"/>
             <p:cNvSpPr/>
             <p:nvPr/>
           </p:nvSpPr>
           <p:spPr>
-            <a:xfrm>
-              <a:off x="5950857" y="2507344"/>
-              <a:ext cx="1611086" cy="682171"/>
+            <a:xfrm rot="19703321">
+              <a:off x="4608502" y="2476893"/>
+              <a:ext cx="1638455" cy="461665"/>
             </a:xfrm>
-            <a:prstGeom prst="flowChartMagneticDisk">
+            <a:prstGeom prst="rect">
               <a:avLst/>
             </a:prstGeom>
-            <a:solidFill>
-              <a:srgbClr val="00B050"/>
-            </a:solidFill>
-            <a:ln w="28575">
-              <a:solidFill>
-                <a:srgbClr val="002060"/>
-              </a:solidFill>
-            </a:ln>
+            <a:noFill/>
           </p:spPr>
-          <p:style>
-            <a:lnRef idx="2">
-              <a:schemeClr val="accent1">
-                <a:shade val="50000"/>
-              </a:schemeClr>
-            </a:lnRef>
-            <a:fillRef idx="1">
-              <a:schemeClr val="accent1"/>
-            </a:fillRef>
-            <a:effectRef idx="0">
-              <a:schemeClr val="accent1"/>
-            </a:effectRef>
-            <a:fontRef idx="minor">
-              <a:schemeClr val="lt1"/>
-            </a:fontRef>
-          </p:style>
           <p:txBody>
-            <a:bodyPr rtlCol="0" anchor="ctr"/>
+            <a:bodyPr wrap="square" lIns="91440" tIns="45720" rIns="91440" bIns="45720">
+              <a:spAutoFit/>
+            </a:bodyPr>
             <a:lstStyle/>
             <a:p>
               <a:pPr algn="ctr"/>
-              <a:endParaRPr lang="ko-KR" altLang="en-US"/>
-            </a:p>
-          </p:txBody>
-        </p:sp>
-        <p:sp>
-          <p:nvSpPr>
-            <p:cNvPr id="6" name="순서도: 자기 디스크 5"/>
-            <p:cNvSpPr/>
-            <p:nvPr/>
-          </p:nvSpPr>
-          <p:spPr>
-            <a:xfrm>
-              <a:off x="5950857" y="2053773"/>
-              <a:ext cx="1611086" cy="682171"/>
-            </a:xfrm>
-            <a:prstGeom prst="flowChartMagneticDisk">
-              <a:avLst/>
-            </a:prstGeom>
-            <a:solidFill>
-              <a:srgbClr val="FFFF00"/>
-            </a:solidFill>
-            <a:ln w="28575">
-              <a:solidFill>
-                <a:srgbClr val="002060"/>
-              </a:solidFill>
-            </a:ln>
-          </p:spPr>
-          <p:style>
-            <a:lnRef idx="2">
-              <a:schemeClr val="accent1">
-                <a:shade val="50000"/>
-              </a:schemeClr>
-            </a:lnRef>
-            <a:fillRef idx="1">
-              <a:schemeClr val="accent1"/>
-            </a:fillRef>
-            <a:effectRef idx="0">
-              <a:schemeClr val="accent1"/>
-            </a:effectRef>
-            <a:fontRef idx="minor">
-              <a:schemeClr val="lt1"/>
-            </a:fontRef>
-          </p:style>
-          <p:txBody>
-            <a:bodyPr rtlCol="0" anchor="ctr"/>
-            <a:lstStyle/>
-            <a:p>
-              <a:pPr algn="ctr"/>
-              <a:endParaRPr lang="ko-KR" altLang="en-US"/>
-            </a:p>
-          </p:txBody>
-        </p:sp>
-        <p:sp>
-          <p:nvSpPr>
-            <p:cNvPr id="4" name="순서도: 자기 디스크 3"/>
-            <p:cNvSpPr/>
-            <p:nvPr/>
-          </p:nvSpPr>
-          <p:spPr>
-            <a:xfrm>
-              <a:off x="5950857" y="1611086"/>
-              <a:ext cx="1611086" cy="682171"/>
-            </a:xfrm>
-            <a:prstGeom prst="flowChartMagneticDisk">
-              <a:avLst/>
-            </a:prstGeom>
-            <a:solidFill>
-              <a:srgbClr val="FF0000"/>
-            </a:solidFill>
-            <a:ln w="28575">
-              <a:solidFill>
-                <a:srgbClr val="002060"/>
-              </a:solidFill>
-            </a:ln>
-          </p:spPr>
-          <p:style>
-            <a:lnRef idx="2">
-              <a:schemeClr val="accent1">
-                <a:shade val="50000"/>
-              </a:schemeClr>
-            </a:lnRef>
-            <a:fillRef idx="1">
-              <a:schemeClr val="accent1"/>
-            </a:fillRef>
-            <a:effectRef idx="0">
-              <a:schemeClr val="accent1"/>
-            </a:effectRef>
-            <a:fontRef idx="minor">
-              <a:schemeClr val="lt1"/>
-            </a:fontRef>
-          </p:style>
-          <p:txBody>
-            <a:bodyPr rtlCol="0" anchor="ctr"/>
-            <a:lstStyle/>
-            <a:p>
-              <a:pPr algn="ctr"/>
-              <a:endParaRPr lang="ko-KR" altLang="en-US"/>
-            </a:p>
-          </p:txBody>
-        </p:sp>
-      </p:grpSp>
-      <p:sp>
-        <p:nvSpPr>
-          <p:cNvPr id="9" name="직사각형 8"/>
-          <p:cNvSpPr/>
-          <p:nvPr/>
-        </p:nvSpPr>
-        <p:spPr>
-          <a:xfrm rot="19703321">
-            <a:off x="4608502" y="2476893"/>
-            <a:ext cx="1638455" cy="461665"/>
-          </a:xfrm>
-          <a:prstGeom prst="rect">
-            <a:avLst/>
-          </a:prstGeom>
-          <a:noFill/>
-        </p:spPr>
-        <p:txBody>
-          <a:bodyPr wrap="square" lIns="91440" tIns="45720" rIns="91440" bIns="45720">
-            <a:spAutoFit/>
-          </a:bodyPr>
-          <a:lstStyle/>
-          <a:p>
-            <a:pPr algn="ctr"/>
-            <a:r>
-              <a:rPr lang="en-US" altLang="ko-KR" sz="2400" cap="none" spc="0" dirty="0" smtClean="0">
+              <a:r>
+                <a:rPr lang="en-US" altLang="ko-KR" sz="2400" cap="none" spc="0" dirty="0" smtClean="0">
+                  <a:ln w="0"/>
+                  <a:solidFill>
+                    <a:schemeClr val="bg1"/>
+                  </a:solidFill>
+                  <a:effectLst>
+                    <a:outerShdw blurRad="38100" dist="25400" dir="5400000" algn="ctr" rotWithShape="0">
+                      <a:srgbClr val="6E747A">
+                        <a:alpha val="43000"/>
+                      </a:srgbClr>
+                    </a:outerShdw>
+                  </a:effectLst>
+                  <a:latin typeface="Microsoft YaHei UI" panose="020B0503020204020204" pitchFamily="34" charset="-122"/>
+                  <a:ea typeface="Microsoft YaHei UI" panose="020B0503020204020204" pitchFamily="34" charset="-122"/>
+                </a:rPr>
+                <a:t>BACKUP</a:t>
+              </a:r>
+              <a:endParaRPr lang="en-US" altLang="ko-KR" sz="2400" cap="none" spc="0" dirty="0">
                 <a:ln w="0"/>
                 <a:solidFill>
                   <a:schemeClr val="bg1"/>
@@ -3205,76 +3238,79 @@
                 </a:effectLst>
                 <a:latin typeface="Microsoft YaHei UI" panose="020B0503020204020204" pitchFamily="34" charset="-122"/>
                 <a:ea typeface="Microsoft YaHei UI" panose="020B0503020204020204" pitchFamily="34" charset="-122"/>
-              </a:rPr>
-              <a:t>BACKUP</a:t>
-            </a:r>
-            <a:endParaRPr lang="en-US" altLang="ko-KR" sz="2400" cap="none" spc="0" dirty="0">
-              <a:ln w="0"/>
-              <a:solidFill>
-                <a:schemeClr val="bg1"/>
-              </a:solidFill>
-              <a:effectLst>
-                <a:outerShdw blurRad="38100" dist="25400" dir="5400000" algn="ctr" rotWithShape="0">
-                  <a:srgbClr val="6E747A">
-                    <a:alpha val="43000"/>
-                  </a:srgbClr>
-                </a:outerShdw>
-              </a:effectLst>
-              <a:latin typeface="Microsoft YaHei UI" panose="020B0503020204020204" pitchFamily="34" charset="-122"/>
-              <a:ea typeface="Microsoft YaHei UI" panose="020B0503020204020204" pitchFamily="34" charset="-122"/>
-            </a:endParaRPr>
-          </a:p>
-        </p:txBody>
-      </p:sp>
-      <p:pic>
-        <p:nvPicPr>
-          <p:cNvPr id="10" name="그림 9"/>
-          <p:cNvPicPr>
-            <a:picLocks noChangeAspect="1"/>
-          </p:cNvPicPr>
-          <p:nvPr/>
-        </p:nvPicPr>
-        <p:blipFill>
-          <a:blip r:embed="rId3"/>
-          <a:stretch>
-            <a:fillRect/>
-          </a:stretch>
-        </p:blipFill>
-        <p:spPr>
-          <a:xfrm rot="19725925">
-            <a:off x="4145265" y="1685502"/>
-            <a:ext cx="609600" cy="514350"/>
-          </a:xfrm>
-          <a:prstGeom prst="rect">
-            <a:avLst/>
-          </a:prstGeom>
-        </p:spPr>
-      </p:pic>
-      <p:sp>
-        <p:nvSpPr>
-          <p:cNvPr id="15" name="직사각형 14"/>
-          <p:cNvSpPr/>
-          <p:nvPr/>
-        </p:nvSpPr>
-        <p:spPr>
-          <a:xfrm rot="19703321">
-            <a:off x="4924731" y="2991726"/>
-            <a:ext cx="1638455" cy="461665"/>
-          </a:xfrm>
-          <a:prstGeom prst="rect">
-            <a:avLst/>
-          </a:prstGeom>
-          <a:noFill/>
-        </p:spPr>
-        <p:txBody>
-          <a:bodyPr wrap="square" lIns="91440" tIns="45720" rIns="91440" bIns="45720">
-            <a:spAutoFit/>
-          </a:bodyPr>
-          <a:lstStyle/>
-          <a:p>
-            <a:pPr algn="ctr"/>
-            <a:r>
-              <a:rPr lang="en-US" altLang="ko-KR" sz="2400" cap="none" spc="0" dirty="0" err="1" smtClean="0">
+              </a:endParaRPr>
+            </a:p>
+          </p:txBody>
+        </p:sp>
+        <p:pic>
+          <p:nvPicPr>
+            <p:cNvPr id="10" name="그림 9"/>
+            <p:cNvPicPr>
+              <a:picLocks noChangeAspect="1"/>
+            </p:cNvPicPr>
+            <p:nvPr/>
+          </p:nvPicPr>
+          <p:blipFill>
+            <a:blip r:embed="rId3"/>
+            <a:stretch>
+              <a:fillRect/>
+            </a:stretch>
+          </p:blipFill>
+          <p:spPr>
+            <a:xfrm rot="19725925">
+              <a:off x="4145265" y="1685502"/>
+              <a:ext cx="609600" cy="514350"/>
+            </a:xfrm>
+            <a:prstGeom prst="rect">
+              <a:avLst/>
+            </a:prstGeom>
+          </p:spPr>
+        </p:pic>
+        <p:sp>
+          <p:nvSpPr>
+            <p:cNvPr id="15" name="직사각형 14"/>
+            <p:cNvSpPr/>
+            <p:nvPr/>
+          </p:nvSpPr>
+          <p:spPr>
+            <a:xfrm rot="19703321">
+              <a:off x="4924731" y="2991726"/>
+              <a:ext cx="1638455" cy="461665"/>
+            </a:xfrm>
+            <a:prstGeom prst="rect">
+              <a:avLst/>
+            </a:prstGeom>
+            <a:noFill/>
+          </p:spPr>
+          <p:txBody>
+            <a:bodyPr wrap="square" lIns="91440" tIns="45720" rIns="91440" bIns="45720">
+              <a:spAutoFit/>
+            </a:bodyPr>
+            <a:lstStyle/>
+            <a:p>
+              <a:pPr algn="ctr"/>
+              <a:r>
+                <a:rPr lang="en-US" altLang="ko-KR" sz="2400" cap="none" spc="0" dirty="0" err="1" smtClean="0">
+                  <a:ln w="0"/>
+                  <a:solidFill>
+                    <a:schemeClr val="tx1">
+                      <a:lumMod val="75000"/>
+                      <a:lumOff val="25000"/>
+                    </a:schemeClr>
+                  </a:solidFill>
+                  <a:effectLst>
+                    <a:outerShdw blurRad="38100" dist="25400" dir="5400000" algn="ctr" rotWithShape="0">
+                      <a:srgbClr val="6E747A">
+                        <a:alpha val="43000"/>
+                      </a:srgbClr>
+                    </a:outerShdw>
+                  </a:effectLst>
+                  <a:latin typeface="Microsoft YaHei UI" panose="020B0503020204020204" pitchFamily="34" charset="-122"/>
+                  <a:ea typeface="Microsoft YaHei UI" panose="020B0503020204020204" pitchFamily="34" charset="-122"/>
+                </a:rPr>
+                <a:t>Golang</a:t>
+              </a:r>
+              <a:endParaRPr lang="en-US" altLang="ko-KR" sz="2400" cap="none" spc="0" dirty="0">
                 <a:ln w="0"/>
                 <a:solidFill>
                   <a:schemeClr val="tx1">
@@ -3291,55 +3327,52 @@
                 </a:effectLst>
                 <a:latin typeface="Microsoft YaHei UI" panose="020B0503020204020204" pitchFamily="34" charset="-122"/>
                 <a:ea typeface="Microsoft YaHei UI" panose="020B0503020204020204" pitchFamily="34" charset="-122"/>
-              </a:rPr>
-              <a:t>Golang</a:t>
-            </a:r>
-            <a:endParaRPr lang="en-US" altLang="ko-KR" sz="2400" cap="none" spc="0" dirty="0">
-              <a:ln w="0"/>
-              <a:solidFill>
-                <a:schemeClr val="tx1">
-                  <a:lumMod val="75000"/>
-                  <a:lumOff val="25000"/>
-                </a:schemeClr>
-              </a:solidFill>
-              <a:effectLst>
-                <a:outerShdw blurRad="38100" dist="25400" dir="5400000" algn="ctr" rotWithShape="0">
-                  <a:srgbClr val="6E747A">
-                    <a:alpha val="43000"/>
-                  </a:srgbClr>
-                </a:outerShdw>
-              </a:effectLst>
-              <a:latin typeface="Microsoft YaHei UI" panose="020B0503020204020204" pitchFamily="34" charset="-122"/>
-              <a:ea typeface="Microsoft YaHei UI" panose="020B0503020204020204" pitchFamily="34" charset="-122"/>
-            </a:endParaRPr>
-          </a:p>
-        </p:txBody>
-      </p:sp>
-      <p:sp>
-        <p:nvSpPr>
-          <p:cNvPr id="16" name="직사각형 15"/>
-          <p:cNvSpPr/>
-          <p:nvPr/>
-        </p:nvSpPr>
-        <p:spPr>
-          <a:xfrm rot="19703321">
-            <a:off x="5217749" y="3499618"/>
-            <a:ext cx="1638455" cy="461665"/>
-          </a:xfrm>
-          <a:prstGeom prst="rect">
-            <a:avLst/>
-          </a:prstGeom>
-          <a:noFill/>
-        </p:spPr>
-        <p:txBody>
-          <a:bodyPr wrap="square" lIns="91440" tIns="45720" rIns="91440" bIns="45720">
-            <a:spAutoFit/>
-          </a:bodyPr>
-          <a:lstStyle/>
-          <a:p>
-            <a:pPr algn="ctr"/>
-            <a:r>
-              <a:rPr lang="en-US" altLang="ko-KR" sz="2400" dirty="0" err="1" smtClean="0">
+              </a:endParaRPr>
+            </a:p>
+          </p:txBody>
+        </p:sp>
+        <p:sp>
+          <p:nvSpPr>
+            <p:cNvPr id="16" name="직사각형 15"/>
+            <p:cNvSpPr/>
+            <p:nvPr/>
+          </p:nvSpPr>
+          <p:spPr>
+            <a:xfrm rot="19703321">
+              <a:off x="5217749" y="3499618"/>
+              <a:ext cx="1638455" cy="461665"/>
+            </a:xfrm>
+            <a:prstGeom prst="rect">
+              <a:avLst/>
+            </a:prstGeom>
+            <a:noFill/>
+          </p:spPr>
+          <p:txBody>
+            <a:bodyPr wrap="square" lIns="91440" tIns="45720" rIns="91440" bIns="45720">
+              <a:spAutoFit/>
+            </a:bodyPr>
+            <a:lstStyle/>
+            <a:p>
+              <a:pPr algn="ctr"/>
+              <a:r>
+                <a:rPr lang="en-US" altLang="ko-KR" sz="2400" dirty="0" err="1" smtClean="0">
+                  <a:ln w="0"/>
+                  <a:solidFill>
+                    <a:schemeClr val="bg1"/>
+                  </a:solidFill>
+                  <a:effectLst>
+                    <a:outerShdw blurRad="38100" dist="25400" dir="5400000" algn="ctr" rotWithShape="0">
+                      <a:srgbClr val="6E747A">
+                        <a:alpha val="43000"/>
+                      </a:srgbClr>
+                    </a:outerShdw>
+                  </a:effectLst>
+                  <a:latin typeface="Microsoft YaHei UI" panose="020B0503020204020204" pitchFamily="34" charset="-122"/>
+                  <a:ea typeface="Microsoft YaHei UI" panose="020B0503020204020204" pitchFamily="34" charset="-122"/>
+                </a:rPr>
+                <a:t>Wattup</a:t>
+              </a:r>
+              <a:endParaRPr lang="en-US" altLang="ko-KR" sz="2400" cap="none" spc="0" dirty="0">
                 <a:ln w="0"/>
                 <a:solidFill>
                   <a:schemeClr val="bg1"/>
@@ -3353,27 +3386,11 @@
                 </a:effectLst>
                 <a:latin typeface="Microsoft YaHei UI" panose="020B0503020204020204" pitchFamily="34" charset="-122"/>
                 <a:ea typeface="Microsoft YaHei UI" panose="020B0503020204020204" pitchFamily="34" charset="-122"/>
-              </a:rPr>
-              <a:t>Wattup</a:t>
-            </a:r>
-            <a:endParaRPr lang="en-US" altLang="ko-KR" sz="2400" cap="none" spc="0" dirty="0">
-              <a:ln w="0"/>
-              <a:solidFill>
-                <a:schemeClr val="bg1"/>
-              </a:solidFill>
-              <a:effectLst>
-                <a:outerShdw blurRad="38100" dist="25400" dir="5400000" algn="ctr" rotWithShape="0">
-                  <a:srgbClr val="6E747A">
-                    <a:alpha val="43000"/>
-                  </a:srgbClr>
-                </a:outerShdw>
-              </a:effectLst>
-              <a:latin typeface="Microsoft YaHei UI" panose="020B0503020204020204" pitchFamily="34" charset="-122"/>
-              <a:ea typeface="Microsoft YaHei UI" panose="020B0503020204020204" pitchFamily="34" charset="-122"/>
-            </a:endParaRPr>
-          </a:p>
-        </p:txBody>
-      </p:sp>
+              </a:endParaRPr>
+            </a:p>
+          </p:txBody>
+        </p:sp>
+      </p:grpSp>
       <p:grpSp>
         <p:nvGrpSpPr>
           <p:cNvPr id="7" name="그룹 6"/>
@@ -3754,6 +3771,1797 @@
 </p:sld>
 </file>
 
+<file path=ppt/slides/slide2.xml><?xml version="1.0" encoding="utf-8"?>
+<p:sld xmlns:a="http://schemas.openxmlformats.org/drawingml/2006/main" xmlns:r="http://schemas.openxmlformats.org/officeDocument/2006/relationships" xmlns:p="http://schemas.openxmlformats.org/presentationml/2006/main">
+  <p:cSld>
+    <p:spTree>
+      <p:nvGrpSpPr>
+        <p:cNvPr id="1" name=""/>
+        <p:cNvGrpSpPr/>
+        <p:nvPr/>
+      </p:nvGrpSpPr>
+      <p:grpSpPr>
+        <a:xfrm>
+          <a:off x="0" y="0"/>
+          <a:ext cx="0" cy="0"/>
+          <a:chOff x="0" y="0"/>
+          <a:chExt cx="0" cy="0"/>
+        </a:xfrm>
+      </p:grpSpPr>
+      <p:pic>
+        <p:nvPicPr>
+          <p:cNvPr id="5" name="Picture 2" descr="https://golang.org/doc/gopher/gopherbw.png"/>
+          <p:cNvPicPr>
+            <a:picLocks noChangeAspect="1" noChangeArrowheads="1"/>
+          </p:cNvPicPr>
+          <p:nvPr/>
+        </p:nvPicPr>
+        <p:blipFill>
+          <a:blip r:embed="rId2" cstate="print">
+            <a:extLst>
+              <a:ext uri="{28A0092B-C50C-407E-A947-70E740481C1C}">
+                <a14:useLocalDpi xmlns:a14="http://schemas.microsoft.com/office/drawing/2010/main" val="0"/>
+              </a:ext>
+            </a:extLst>
+          </a:blip>
+          <a:srcRect/>
+          <a:stretch>
+            <a:fillRect/>
+          </a:stretch>
+        </p:blipFill>
+        <p:spPr bwMode="auto">
+          <a:xfrm>
+            <a:off x="-237076" y="644716"/>
+            <a:ext cx="5842000" cy="5842000"/>
+          </a:xfrm>
+          <a:prstGeom prst="rect">
+            <a:avLst/>
+          </a:prstGeom>
+          <a:noFill/>
+          <a:extLst>
+            <a:ext uri="{909E8E84-426E-40DD-AFC4-6F175D3DCCD1}">
+              <a14:hiddenFill xmlns:a14="http://schemas.microsoft.com/office/drawing/2010/main">
+                <a:solidFill>
+                  <a:srgbClr val="FFFFFF"/>
+                </a:solidFill>
+              </a14:hiddenFill>
+            </a:ext>
+          </a:extLst>
+        </p:spPr>
+      </p:pic>
+      <p:grpSp>
+        <p:nvGrpSpPr>
+          <p:cNvPr id="6" name="그룹 5"/>
+          <p:cNvGrpSpPr/>
+          <p:nvPr/>
+        </p:nvGrpSpPr>
+        <p:grpSpPr>
+          <a:xfrm rot="19639182">
+            <a:off x="3747330" y="1970762"/>
+            <a:ext cx="1795763" cy="2099884"/>
+            <a:chOff x="5950857" y="1611086"/>
+            <a:chExt cx="1611086" cy="1578429"/>
+          </a:xfrm>
+          <a:solidFill>
+            <a:srgbClr val="F8C034"/>
+          </a:solidFill>
+        </p:grpSpPr>
+        <p:sp>
+          <p:nvSpPr>
+            <p:cNvPr id="11" name="순서도: 자기 디스크 10"/>
+            <p:cNvSpPr/>
+            <p:nvPr/>
+          </p:nvSpPr>
+          <p:spPr>
+            <a:xfrm>
+              <a:off x="5950857" y="2507344"/>
+              <a:ext cx="1611086" cy="682171"/>
+            </a:xfrm>
+            <a:prstGeom prst="flowChartMagneticDisk">
+              <a:avLst/>
+            </a:prstGeom>
+            <a:solidFill>
+              <a:srgbClr val="00B050"/>
+            </a:solidFill>
+            <a:ln w="28575">
+              <a:solidFill>
+                <a:srgbClr val="002060"/>
+              </a:solidFill>
+            </a:ln>
+          </p:spPr>
+          <p:style>
+            <a:lnRef idx="2">
+              <a:schemeClr val="accent1">
+                <a:shade val="50000"/>
+              </a:schemeClr>
+            </a:lnRef>
+            <a:fillRef idx="1">
+              <a:schemeClr val="accent1"/>
+            </a:fillRef>
+            <a:effectRef idx="0">
+              <a:schemeClr val="accent1"/>
+            </a:effectRef>
+            <a:fontRef idx="minor">
+              <a:schemeClr val="lt1"/>
+            </a:fontRef>
+          </p:style>
+          <p:txBody>
+            <a:bodyPr rtlCol="0" anchor="ctr"/>
+            <a:lstStyle/>
+            <a:p>
+              <a:pPr algn="ctr"/>
+              <a:endParaRPr lang="ko-KR" altLang="en-US"/>
+            </a:p>
+          </p:txBody>
+        </p:sp>
+        <p:sp>
+          <p:nvSpPr>
+            <p:cNvPr id="12" name="순서도: 자기 디스크 11"/>
+            <p:cNvSpPr/>
+            <p:nvPr/>
+          </p:nvSpPr>
+          <p:spPr>
+            <a:xfrm>
+              <a:off x="5950857" y="2053773"/>
+              <a:ext cx="1611086" cy="682171"/>
+            </a:xfrm>
+            <a:prstGeom prst="flowChartMagneticDisk">
+              <a:avLst/>
+            </a:prstGeom>
+            <a:solidFill>
+              <a:srgbClr val="FFFF00"/>
+            </a:solidFill>
+            <a:ln w="28575">
+              <a:solidFill>
+                <a:srgbClr val="002060"/>
+              </a:solidFill>
+            </a:ln>
+          </p:spPr>
+          <p:style>
+            <a:lnRef idx="2">
+              <a:schemeClr val="accent1">
+                <a:shade val="50000"/>
+              </a:schemeClr>
+            </a:lnRef>
+            <a:fillRef idx="1">
+              <a:schemeClr val="accent1"/>
+            </a:fillRef>
+            <a:effectRef idx="0">
+              <a:schemeClr val="accent1"/>
+            </a:effectRef>
+            <a:fontRef idx="minor">
+              <a:schemeClr val="lt1"/>
+            </a:fontRef>
+          </p:style>
+          <p:txBody>
+            <a:bodyPr rtlCol="0" anchor="ctr"/>
+            <a:lstStyle/>
+            <a:p>
+              <a:pPr algn="ctr"/>
+              <a:endParaRPr lang="ko-KR" altLang="en-US"/>
+            </a:p>
+          </p:txBody>
+        </p:sp>
+        <p:sp>
+          <p:nvSpPr>
+            <p:cNvPr id="13" name="순서도: 자기 디스크 12"/>
+            <p:cNvSpPr/>
+            <p:nvPr/>
+          </p:nvSpPr>
+          <p:spPr>
+            <a:xfrm>
+              <a:off x="5950857" y="1611086"/>
+              <a:ext cx="1611086" cy="682171"/>
+            </a:xfrm>
+            <a:prstGeom prst="flowChartMagneticDisk">
+              <a:avLst/>
+            </a:prstGeom>
+            <a:solidFill>
+              <a:srgbClr val="FF0000"/>
+            </a:solidFill>
+            <a:ln w="28575">
+              <a:solidFill>
+                <a:srgbClr val="002060"/>
+              </a:solidFill>
+            </a:ln>
+          </p:spPr>
+          <p:style>
+            <a:lnRef idx="2">
+              <a:schemeClr val="accent1">
+                <a:shade val="50000"/>
+              </a:schemeClr>
+            </a:lnRef>
+            <a:fillRef idx="1">
+              <a:schemeClr val="accent1"/>
+            </a:fillRef>
+            <a:effectRef idx="0">
+              <a:schemeClr val="accent1"/>
+            </a:effectRef>
+            <a:fontRef idx="minor">
+              <a:schemeClr val="lt1"/>
+            </a:fontRef>
+          </p:style>
+          <p:txBody>
+            <a:bodyPr rtlCol="0" anchor="ctr"/>
+            <a:lstStyle/>
+            <a:p>
+              <a:pPr algn="ctr"/>
+              <a:endParaRPr lang="ko-KR" altLang="en-US"/>
+            </a:p>
+          </p:txBody>
+        </p:sp>
+      </p:grpSp>
+      <p:sp>
+        <p:nvSpPr>
+          <p:cNvPr id="7" name="직사각형 6"/>
+          <p:cNvSpPr/>
+          <p:nvPr/>
+        </p:nvSpPr>
+        <p:spPr>
+          <a:xfrm rot="19703321">
+            <a:off x="3587655" y="2395894"/>
+            <a:ext cx="1638455" cy="461665"/>
+          </a:xfrm>
+          <a:prstGeom prst="rect">
+            <a:avLst/>
+          </a:prstGeom>
+          <a:noFill/>
+        </p:spPr>
+        <p:txBody>
+          <a:bodyPr wrap="square" lIns="91440" tIns="45720" rIns="91440" bIns="45720">
+            <a:spAutoFit/>
+          </a:bodyPr>
+          <a:lstStyle/>
+          <a:p>
+            <a:pPr algn="ctr"/>
+            <a:r>
+              <a:rPr lang="en-US" altLang="ko-KR" sz="2400" cap="none" spc="0" dirty="0" smtClean="0">
+                <a:ln w="0"/>
+                <a:solidFill>
+                  <a:schemeClr val="bg1"/>
+                </a:solidFill>
+                <a:effectLst>
+                  <a:outerShdw blurRad="38100" dist="25400" dir="5400000" algn="ctr" rotWithShape="0">
+                    <a:srgbClr val="6E747A">
+                      <a:alpha val="43000"/>
+                    </a:srgbClr>
+                  </a:outerShdw>
+                </a:effectLst>
+                <a:latin typeface="Microsoft YaHei UI" panose="020B0503020204020204" pitchFamily="34" charset="-122"/>
+                <a:ea typeface="Microsoft YaHei UI" panose="020B0503020204020204" pitchFamily="34" charset="-122"/>
+              </a:rPr>
+              <a:t>BACKUP</a:t>
+            </a:r>
+            <a:endParaRPr lang="en-US" altLang="ko-KR" sz="2400" cap="none" spc="0" dirty="0">
+              <a:ln w="0"/>
+              <a:solidFill>
+                <a:schemeClr val="bg1"/>
+              </a:solidFill>
+              <a:effectLst>
+                <a:outerShdw blurRad="38100" dist="25400" dir="5400000" algn="ctr" rotWithShape="0">
+                  <a:srgbClr val="6E747A">
+                    <a:alpha val="43000"/>
+                  </a:srgbClr>
+                </a:outerShdw>
+              </a:effectLst>
+              <a:latin typeface="Microsoft YaHei UI" panose="020B0503020204020204" pitchFamily="34" charset="-122"/>
+              <a:ea typeface="Microsoft YaHei UI" panose="020B0503020204020204" pitchFamily="34" charset="-122"/>
+            </a:endParaRPr>
+          </a:p>
+        </p:txBody>
+      </p:sp>
+      <p:pic>
+        <p:nvPicPr>
+          <p:cNvPr id="8" name="그림 7"/>
+          <p:cNvPicPr>
+            <a:picLocks noChangeAspect="1"/>
+          </p:cNvPicPr>
+          <p:nvPr/>
+        </p:nvPicPr>
+        <p:blipFill>
+          <a:blip r:embed="rId3"/>
+          <a:stretch>
+            <a:fillRect/>
+          </a:stretch>
+        </p:blipFill>
+        <p:spPr>
+          <a:xfrm rot="19725925">
+            <a:off x="3124418" y="1604503"/>
+            <a:ext cx="609600" cy="514350"/>
+          </a:xfrm>
+          <a:prstGeom prst="rect">
+            <a:avLst/>
+          </a:prstGeom>
+        </p:spPr>
+      </p:pic>
+      <p:sp>
+        <p:nvSpPr>
+          <p:cNvPr id="9" name="직사각형 8"/>
+          <p:cNvSpPr/>
+          <p:nvPr/>
+        </p:nvSpPr>
+        <p:spPr>
+          <a:xfrm rot="19703321">
+            <a:off x="3903884" y="2910727"/>
+            <a:ext cx="1638455" cy="461665"/>
+          </a:xfrm>
+          <a:prstGeom prst="rect">
+            <a:avLst/>
+          </a:prstGeom>
+          <a:noFill/>
+        </p:spPr>
+        <p:txBody>
+          <a:bodyPr wrap="square" lIns="91440" tIns="45720" rIns="91440" bIns="45720">
+            <a:spAutoFit/>
+          </a:bodyPr>
+          <a:lstStyle/>
+          <a:p>
+            <a:pPr algn="ctr"/>
+            <a:r>
+              <a:rPr lang="en-US" altLang="ko-KR" sz="2400" cap="none" spc="0" dirty="0" err="1" smtClean="0">
+                <a:ln w="0"/>
+                <a:solidFill>
+                  <a:schemeClr val="tx1">
+                    <a:lumMod val="75000"/>
+                    <a:lumOff val="25000"/>
+                  </a:schemeClr>
+                </a:solidFill>
+                <a:effectLst>
+                  <a:outerShdw blurRad="38100" dist="25400" dir="5400000" algn="ctr" rotWithShape="0">
+                    <a:srgbClr val="6E747A">
+                      <a:alpha val="43000"/>
+                    </a:srgbClr>
+                  </a:outerShdw>
+                </a:effectLst>
+                <a:latin typeface="Microsoft YaHei UI" panose="020B0503020204020204" pitchFamily="34" charset="-122"/>
+                <a:ea typeface="Microsoft YaHei UI" panose="020B0503020204020204" pitchFamily="34" charset="-122"/>
+              </a:rPr>
+              <a:t>Golang</a:t>
+            </a:r>
+            <a:endParaRPr lang="en-US" altLang="ko-KR" sz="2400" cap="none" spc="0" dirty="0">
+              <a:ln w="0"/>
+              <a:solidFill>
+                <a:schemeClr val="tx1">
+                  <a:lumMod val="75000"/>
+                  <a:lumOff val="25000"/>
+                </a:schemeClr>
+              </a:solidFill>
+              <a:effectLst>
+                <a:outerShdw blurRad="38100" dist="25400" dir="5400000" algn="ctr" rotWithShape="0">
+                  <a:srgbClr val="6E747A">
+                    <a:alpha val="43000"/>
+                  </a:srgbClr>
+                </a:outerShdw>
+              </a:effectLst>
+              <a:latin typeface="Microsoft YaHei UI" panose="020B0503020204020204" pitchFamily="34" charset="-122"/>
+              <a:ea typeface="Microsoft YaHei UI" panose="020B0503020204020204" pitchFamily="34" charset="-122"/>
+            </a:endParaRPr>
+          </a:p>
+        </p:txBody>
+      </p:sp>
+      <p:sp>
+        <p:nvSpPr>
+          <p:cNvPr id="10" name="직사각형 9"/>
+          <p:cNvSpPr/>
+          <p:nvPr/>
+        </p:nvSpPr>
+        <p:spPr>
+          <a:xfrm rot="19703321">
+            <a:off x="4196902" y="3418619"/>
+            <a:ext cx="1638455" cy="461665"/>
+          </a:xfrm>
+          <a:prstGeom prst="rect">
+            <a:avLst/>
+          </a:prstGeom>
+          <a:noFill/>
+        </p:spPr>
+        <p:txBody>
+          <a:bodyPr wrap="square" lIns="91440" tIns="45720" rIns="91440" bIns="45720">
+            <a:spAutoFit/>
+          </a:bodyPr>
+          <a:lstStyle/>
+          <a:p>
+            <a:pPr algn="ctr"/>
+            <a:r>
+              <a:rPr lang="en-US" altLang="ko-KR" sz="2400" dirty="0" err="1" smtClean="0">
+                <a:ln w="0"/>
+                <a:solidFill>
+                  <a:schemeClr val="bg1"/>
+                </a:solidFill>
+                <a:effectLst>
+                  <a:outerShdw blurRad="38100" dist="25400" dir="5400000" algn="ctr" rotWithShape="0">
+                    <a:srgbClr val="6E747A">
+                      <a:alpha val="43000"/>
+                    </a:srgbClr>
+                  </a:outerShdw>
+                </a:effectLst>
+                <a:latin typeface="Microsoft YaHei UI" panose="020B0503020204020204" pitchFamily="34" charset="-122"/>
+                <a:ea typeface="Microsoft YaHei UI" panose="020B0503020204020204" pitchFamily="34" charset="-122"/>
+              </a:rPr>
+              <a:t>Wattup</a:t>
+            </a:r>
+            <a:endParaRPr lang="en-US" altLang="ko-KR" sz="2400" cap="none" spc="0" dirty="0">
+              <a:ln w="0"/>
+              <a:solidFill>
+                <a:schemeClr val="bg1"/>
+              </a:solidFill>
+              <a:effectLst>
+                <a:outerShdw blurRad="38100" dist="25400" dir="5400000" algn="ctr" rotWithShape="0">
+                  <a:srgbClr val="6E747A">
+                    <a:alpha val="43000"/>
+                  </a:srgbClr>
+                </a:outerShdw>
+              </a:effectLst>
+              <a:latin typeface="Microsoft YaHei UI" panose="020B0503020204020204" pitchFamily="34" charset="-122"/>
+              <a:ea typeface="Microsoft YaHei UI" panose="020B0503020204020204" pitchFamily="34" charset="-122"/>
+            </a:endParaRPr>
+          </a:p>
+        </p:txBody>
+      </p:sp>
+      <p:grpSp>
+        <p:nvGrpSpPr>
+          <p:cNvPr id="30" name="그룹 29"/>
+          <p:cNvGrpSpPr/>
+          <p:nvPr/>
+        </p:nvGrpSpPr>
+        <p:grpSpPr>
+          <a:xfrm>
+            <a:off x="7557746" y="2136302"/>
+            <a:ext cx="3238721" cy="884403"/>
+            <a:chOff x="6845747" y="2718857"/>
+            <a:chExt cx="4568375" cy="1247494"/>
+          </a:xfrm>
+        </p:grpSpPr>
+        <p:pic>
+          <p:nvPicPr>
+            <p:cNvPr id="31" name="Picture 2" descr="C:\Users\wondory\Desktop\aaa.png"/>
+            <p:cNvPicPr>
+              <a:picLocks noChangeAspect="1" noChangeArrowheads="1"/>
+            </p:cNvPicPr>
+            <p:nvPr/>
+          </p:nvPicPr>
+          <p:blipFill>
+            <a:blip r:embed="rId4" cstate="print">
+              <a:extLst>
+                <a:ext uri="{28A0092B-C50C-407E-A947-70E740481C1C}">
+                  <a14:useLocalDpi xmlns:a14="http://schemas.microsoft.com/office/drawing/2010/main" val="0"/>
+                </a:ext>
+              </a:extLst>
+            </a:blip>
+            <a:srcRect/>
+            <a:stretch>
+              <a:fillRect/>
+            </a:stretch>
+          </p:blipFill>
+          <p:spPr bwMode="auto">
+            <a:xfrm>
+              <a:off x="10342787" y="2718857"/>
+              <a:ext cx="1071335" cy="1247494"/>
+            </a:xfrm>
+            <a:prstGeom prst="rect">
+              <a:avLst/>
+            </a:prstGeom>
+            <a:noFill/>
+            <a:extLst>
+              <a:ext uri="{909E8E84-426E-40DD-AFC4-6F175D3DCCD1}">
+                <a14:hiddenFill xmlns:a14="http://schemas.microsoft.com/office/drawing/2010/main">
+                  <a:solidFill>
+                    <a:srgbClr val="FFFFFF"/>
+                  </a:solidFill>
+                </a14:hiddenFill>
+              </a:ext>
+            </a:extLst>
+          </p:spPr>
+        </p:pic>
+        <p:pic>
+          <p:nvPicPr>
+            <p:cNvPr id="32" name="Picture 2" descr="C:\Users\wondory\Desktop\aaa.png"/>
+            <p:cNvPicPr>
+              <a:picLocks noChangeAspect="1" noChangeArrowheads="1"/>
+            </p:cNvPicPr>
+            <p:nvPr/>
+          </p:nvPicPr>
+          <p:blipFill>
+            <a:blip r:embed="rId4" cstate="print">
+              <a:extLst>
+                <a:ext uri="{28A0092B-C50C-407E-A947-70E740481C1C}">
+                  <a14:useLocalDpi xmlns:a14="http://schemas.microsoft.com/office/drawing/2010/main" val="0"/>
+                </a:ext>
+              </a:extLst>
+            </a:blip>
+            <a:srcRect/>
+            <a:stretch>
+              <a:fillRect/>
+            </a:stretch>
+          </p:blipFill>
+          <p:spPr bwMode="auto">
+            <a:xfrm>
+              <a:off x="9177107" y="2718857"/>
+              <a:ext cx="1071335" cy="1247494"/>
+            </a:xfrm>
+            <a:prstGeom prst="rect">
+              <a:avLst/>
+            </a:prstGeom>
+            <a:noFill/>
+            <a:extLst>
+              <a:ext uri="{909E8E84-426E-40DD-AFC4-6F175D3DCCD1}">
+                <a14:hiddenFill xmlns:a14="http://schemas.microsoft.com/office/drawing/2010/main">
+                  <a:solidFill>
+                    <a:srgbClr val="FFFFFF"/>
+                  </a:solidFill>
+                </a14:hiddenFill>
+              </a:ext>
+            </a:extLst>
+          </p:spPr>
+        </p:pic>
+        <p:pic>
+          <p:nvPicPr>
+            <p:cNvPr id="33" name="Picture 2" descr="C:\Users\wondory\Desktop\aaa.png"/>
+            <p:cNvPicPr>
+              <a:picLocks noChangeAspect="1" noChangeArrowheads="1"/>
+            </p:cNvPicPr>
+            <p:nvPr/>
+          </p:nvPicPr>
+          <p:blipFill>
+            <a:blip r:embed="rId4" cstate="print">
+              <a:extLst>
+                <a:ext uri="{28A0092B-C50C-407E-A947-70E740481C1C}">
+                  <a14:useLocalDpi xmlns:a14="http://schemas.microsoft.com/office/drawing/2010/main" val="0"/>
+                </a:ext>
+              </a:extLst>
+            </a:blip>
+            <a:srcRect/>
+            <a:stretch>
+              <a:fillRect/>
+            </a:stretch>
+          </p:blipFill>
+          <p:spPr bwMode="auto">
+            <a:xfrm>
+              <a:off x="8011427" y="2718857"/>
+              <a:ext cx="1071335" cy="1247494"/>
+            </a:xfrm>
+            <a:prstGeom prst="rect">
+              <a:avLst/>
+            </a:prstGeom>
+            <a:noFill/>
+            <a:extLst>
+              <a:ext uri="{909E8E84-426E-40DD-AFC4-6F175D3DCCD1}">
+                <a14:hiddenFill xmlns:a14="http://schemas.microsoft.com/office/drawing/2010/main">
+                  <a:solidFill>
+                    <a:srgbClr val="FFFFFF"/>
+                  </a:solidFill>
+                </a14:hiddenFill>
+              </a:ext>
+            </a:extLst>
+          </p:spPr>
+        </p:pic>
+        <p:pic>
+          <p:nvPicPr>
+            <p:cNvPr id="34" name="Picture 2" descr="C:\Users\wondory\Desktop\aaa.png"/>
+            <p:cNvPicPr>
+              <a:picLocks noChangeAspect="1" noChangeArrowheads="1"/>
+            </p:cNvPicPr>
+            <p:nvPr/>
+          </p:nvPicPr>
+          <p:blipFill>
+            <a:blip r:embed="rId4" cstate="print">
+              <a:extLst>
+                <a:ext uri="{28A0092B-C50C-407E-A947-70E740481C1C}">
+                  <a14:useLocalDpi xmlns:a14="http://schemas.microsoft.com/office/drawing/2010/main" val="0"/>
+                </a:ext>
+              </a:extLst>
+            </a:blip>
+            <a:srcRect/>
+            <a:stretch>
+              <a:fillRect/>
+            </a:stretch>
+          </p:blipFill>
+          <p:spPr bwMode="auto">
+            <a:xfrm>
+              <a:off x="6845747" y="2718857"/>
+              <a:ext cx="1071335" cy="1247494"/>
+            </a:xfrm>
+            <a:prstGeom prst="rect">
+              <a:avLst/>
+            </a:prstGeom>
+            <a:noFill/>
+            <a:extLst>
+              <a:ext uri="{909E8E84-426E-40DD-AFC4-6F175D3DCCD1}">
+                <a14:hiddenFill xmlns:a14="http://schemas.microsoft.com/office/drawing/2010/main">
+                  <a:solidFill>
+                    <a:srgbClr val="FFFFFF"/>
+                  </a:solidFill>
+                </a14:hiddenFill>
+              </a:ext>
+            </a:extLst>
+          </p:spPr>
+        </p:pic>
+      </p:grpSp>
+      <p:grpSp>
+        <p:nvGrpSpPr>
+          <p:cNvPr id="29" name="그룹 28"/>
+          <p:cNvGrpSpPr/>
+          <p:nvPr/>
+        </p:nvGrpSpPr>
+        <p:grpSpPr>
+          <a:xfrm>
+            <a:off x="7244294" y="3086456"/>
+            <a:ext cx="3858517" cy="1053652"/>
+            <a:chOff x="6845747" y="2718857"/>
+            <a:chExt cx="4568375" cy="1247494"/>
+          </a:xfrm>
+        </p:grpSpPr>
+        <p:pic>
+          <p:nvPicPr>
+            <p:cNvPr id="25" name="Picture 2" descr="C:\Users\wondory\Desktop\aaa.png"/>
+            <p:cNvPicPr>
+              <a:picLocks noChangeAspect="1" noChangeArrowheads="1"/>
+            </p:cNvPicPr>
+            <p:nvPr/>
+          </p:nvPicPr>
+          <p:blipFill>
+            <a:blip r:embed="rId5" cstate="print">
+              <a:extLst>
+                <a:ext uri="{28A0092B-C50C-407E-A947-70E740481C1C}">
+                  <a14:useLocalDpi xmlns:a14="http://schemas.microsoft.com/office/drawing/2010/main" val="0"/>
+                </a:ext>
+              </a:extLst>
+            </a:blip>
+            <a:srcRect/>
+            <a:stretch>
+              <a:fillRect/>
+            </a:stretch>
+          </p:blipFill>
+          <p:spPr bwMode="auto">
+            <a:xfrm>
+              <a:off x="10342787" y="2718857"/>
+              <a:ext cx="1071335" cy="1247494"/>
+            </a:xfrm>
+            <a:prstGeom prst="rect">
+              <a:avLst/>
+            </a:prstGeom>
+            <a:noFill/>
+            <a:extLst>
+              <a:ext uri="{909E8E84-426E-40DD-AFC4-6F175D3DCCD1}">
+                <a14:hiddenFill xmlns:a14="http://schemas.microsoft.com/office/drawing/2010/main">
+                  <a:solidFill>
+                    <a:srgbClr val="FFFFFF"/>
+                  </a:solidFill>
+                </a14:hiddenFill>
+              </a:ext>
+            </a:extLst>
+          </p:spPr>
+        </p:pic>
+        <p:pic>
+          <p:nvPicPr>
+            <p:cNvPr id="26" name="Picture 2" descr="C:\Users\wondory\Desktop\aaa.png"/>
+            <p:cNvPicPr>
+              <a:picLocks noChangeAspect="1" noChangeArrowheads="1"/>
+            </p:cNvPicPr>
+            <p:nvPr/>
+          </p:nvPicPr>
+          <p:blipFill>
+            <a:blip r:embed="rId5" cstate="print">
+              <a:extLst>
+                <a:ext uri="{28A0092B-C50C-407E-A947-70E740481C1C}">
+                  <a14:useLocalDpi xmlns:a14="http://schemas.microsoft.com/office/drawing/2010/main" val="0"/>
+                </a:ext>
+              </a:extLst>
+            </a:blip>
+            <a:srcRect/>
+            <a:stretch>
+              <a:fillRect/>
+            </a:stretch>
+          </p:blipFill>
+          <p:spPr bwMode="auto">
+            <a:xfrm>
+              <a:off x="9177107" y="2718857"/>
+              <a:ext cx="1071335" cy="1247494"/>
+            </a:xfrm>
+            <a:prstGeom prst="rect">
+              <a:avLst/>
+            </a:prstGeom>
+            <a:noFill/>
+            <a:extLst>
+              <a:ext uri="{909E8E84-426E-40DD-AFC4-6F175D3DCCD1}">
+                <a14:hiddenFill xmlns:a14="http://schemas.microsoft.com/office/drawing/2010/main">
+                  <a:solidFill>
+                    <a:srgbClr val="FFFFFF"/>
+                  </a:solidFill>
+                </a14:hiddenFill>
+              </a:ext>
+            </a:extLst>
+          </p:spPr>
+        </p:pic>
+        <p:pic>
+          <p:nvPicPr>
+            <p:cNvPr id="27" name="Picture 2" descr="C:\Users\wondory\Desktop\aaa.png"/>
+            <p:cNvPicPr>
+              <a:picLocks noChangeAspect="1" noChangeArrowheads="1"/>
+            </p:cNvPicPr>
+            <p:nvPr/>
+          </p:nvPicPr>
+          <p:blipFill>
+            <a:blip r:embed="rId5" cstate="print">
+              <a:extLst>
+                <a:ext uri="{28A0092B-C50C-407E-A947-70E740481C1C}">
+                  <a14:useLocalDpi xmlns:a14="http://schemas.microsoft.com/office/drawing/2010/main" val="0"/>
+                </a:ext>
+              </a:extLst>
+            </a:blip>
+            <a:srcRect/>
+            <a:stretch>
+              <a:fillRect/>
+            </a:stretch>
+          </p:blipFill>
+          <p:spPr bwMode="auto">
+            <a:xfrm>
+              <a:off x="8011427" y="2718857"/>
+              <a:ext cx="1071335" cy="1247494"/>
+            </a:xfrm>
+            <a:prstGeom prst="rect">
+              <a:avLst/>
+            </a:prstGeom>
+            <a:noFill/>
+            <a:extLst>
+              <a:ext uri="{909E8E84-426E-40DD-AFC4-6F175D3DCCD1}">
+                <a14:hiddenFill xmlns:a14="http://schemas.microsoft.com/office/drawing/2010/main">
+                  <a:solidFill>
+                    <a:srgbClr val="FFFFFF"/>
+                  </a:solidFill>
+                </a14:hiddenFill>
+              </a:ext>
+            </a:extLst>
+          </p:spPr>
+        </p:pic>
+        <p:pic>
+          <p:nvPicPr>
+            <p:cNvPr id="28" name="Picture 2" descr="C:\Users\wondory\Desktop\aaa.png"/>
+            <p:cNvPicPr>
+              <a:picLocks noChangeAspect="1" noChangeArrowheads="1"/>
+            </p:cNvPicPr>
+            <p:nvPr/>
+          </p:nvPicPr>
+          <p:blipFill>
+            <a:blip r:embed="rId5" cstate="print">
+              <a:extLst>
+                <a:ext uri="{28A0092B-C50C-407E-A947-70E740481C1C}">
+                  <a14:useLocalDpi xmlns:a14="http://schemas.microsoft.com/office/drawing/2010/main" val="0"/>
+                </a:ext>
+              </a:extLst>
+            </a:blip>
+            <a:srcRect/>
+            <a:stretch>
+              <a:fillRect/>
+            </a:stretch>
+          </p:blipFill>
+          <p:spPr bwMode="auto">
+            <a:xfrm>
+              <a:off x="6845747" y="2718857"/>
+              <a:ext cx="1071335" cy="1247494"/>
+            </a:xfrm>
+            <a:prstGeom prst="rect">
+              <a:avLst/>
+            </a:prstGeom>
+            <a:noFill/>
+            <a:extLst>
+              <a:ext uri="{909E8E84-426E-40DD-AFC4-6F175D3DCCD1}">
+                <a14:hiddenFill xmlns:a14="http://schemas.microsoft.com/office/drawing/2010/main">
+                  <a:solidFill>
+                    <a:srgbClr val="FFFFFF"/>
+                  </a:solidFill>
+                </a14:hiddenFill>
+              </a:ext>
+            </a:extLst>
+          </p:spPr>
+        </p:pic>
+      </p:grpSp>
+      <p:grpSp>
+        <p:nvGrpSpPr>
+          <p:cNvPr id="35" name="그룹 34"/>
+          <p:cNvGrpSpPr/>
+          <p:nvPr/>
+        </p:nvGrpSpPr>
+        <p:grpSpPr>
+          <a:xfrm>
+            <a:off x="6940092" y="4199368"/>
+            <a:ext cx="4568375" cy="1247494"/>
+            <a:chOff x="6940092" y="4486815"/>
+            <a:chExt cx="4568375" cy="1247494"/>
+          </a:xfrm>
+        </p:grpSpPr>
+        <p:pic>
+          <p:nvPicPr>
+            <p:cNvPr id="15" name="Picture 2" descr="C:\Users\wondory\Desktop\aaa.png"/>
+            <p:cNvPicPr>
+              <a:picLocks noChangeAspect="1" noChangeArrowheads="1"/>
+            </p:cNvPicPr>
+            <p:nvPr/>
+          </p:nvPicPr>
+          <p:blipFill>
+            <a:blip r:embed="rId6" cstate="print">
+              <a:extLst>
+                <a:ext uri="{28A0092B-C50C-407E-A947-70E740481C1C}">
+                  <a14:useLocalDpi xmlns:a14="http://schemas.microsoft.com/office/drawing/2010/main" val="0"/>
+                </a:ext>
+              </a:extLst>
+            </a:blip>
+            <a:srcRect/>
+            <a:stretch>
+              <a:fillRect/>
+            </a:stretch>
+          </p:blipFill>
+          <p:spPr bwMode="auto">
+            <a:xfrm>
+              <a:off x="9271452" y="4486815"/>
+              <a:ext cx="1071335" cy="1247494"/>
+            </a:xfrm>
+            <a:prstGeom prst="rect">
+              <a:avLst/>
+            </a:prstGeom>
+            <a:noFill/>
+            <a:extLst>
+              <a:ext uri="{909E8E84-426E-40DD-AFC4-6F175D3DCCD1}">
+                <a14:hiddenFill xmlns:a14="http://schemas.microsoft.com/office/drawing/2010/main">
+                  <a:solidFill>
+                    <a:srgbClr val="FFFFFF"/>
+                  </a:solidFill>
+                </a14:hiddenFill>
+              </a:ext>
+            </a:extLst>
+          </p:spPr>
+        </p:pic>
+        <p:pic>
+          <p:nvPicPr>
+            <p:cNvPr id="16" name="Picture 2" descr="C:\Users\wondory\Desktop\aaa.png"/>
+            <p:cNvPicPr>
+              <a:picLocks noChangeAspect="1" noChangeArrowheads="1"/>
+            </p:cNvPicPr>
+            <p:nvPr/>
+          </p:nvPicPr>
+          <p:blipFill>
+            <a:blip r:embed="rId6" cstate="print">
+              <a:extLst>
+                <a:ext uri="{28A0092B-C50C-407E-A947-70E740481C1C}">
+                  <a14:useLocalDpi xmlns:a14="http://schemas.microsoft.com/office/drawing/2010/main" val="0"/>
+                </a:ext>
+              </a:extLst>
+            </a:blip>
+            <a:srcRect/>
+            <a:stretch>
+              <a:fillRect/>
+            </a:stretch>
+          </p:blipFill>
+          <p:spPr bwMode="auto">
+            <a:xfrm>
+              <a:off x="8105772" y="4486815"/>
+              <a:ext cx="1071335" cy="1247494"/>
+            </a:xfrm>
+            <a:prstGeom prst="rect">
+              <a:avLst/>
+            </a:prstGeom>
+            <a:noFill/>
+            <a:extLst>
+              <a:ext uri="{909E8E84-426E-40DD-AFC4-6F175D3DCCD1}">
+                <a14:hiddenFill xmlns:a14="http://schemas.microsoft.com/office/drawing/2010/main">
+                  <a:solidFill>
+                    <a:srgbClr val="FFFFFF"/>
+                  </a:solidFill>
+                </a14:hiddenFill>
+              </a:ext>
+            </a:extLst>
+          </p:spPr>
+        </p:pic>
+        <p:pic>
+          <p:nvPicPr>
+            <p:cNvPr id="17" name="Picture 2" descr="C:\Users\wondory\Desktop\aaa.png"/>
+            <p:cNvPicPr>
+              <a:picLocks noChangeAspect="1" noChangeArrowheads="1"/>
+            </p:cNvPicPr>
+            <p:nvPr/>
+          </p:nvPicPr>
+          <p:blipFill>
+            <a:blip r:embed="rId6" cstate="print">
+              <a:extLst>
+                <a:ext uri="{28A0092B-C50C-407E-A947-70E740481C1C}">
+                  <a14:useLocalDpi xmlns:a14="http://schemas.microsoft.com/office/drawing/2010/main" val="0"/>
+                </a:ext>
+              </a:extLst>
+            </a:blip>
+            <a:srcRect/>
+            <a:stretch>
+              <a:fillRect/>
+            </a:stretch>
+          </p:blipFill>
+          <p:spPr bwMode="auto">
+            <a:xfrm>
+              <a:off x="6940092" y="4486815"/>
+              <a:ext cx="1071335" cy="1247494"/>
+            </a:xfrm>
+            <a:prstGeom prst="rect">
+              <a:avLst/>
+            </a:prstGeom>
+            <a:noFill/>
+            <a:extLst>
+              <a:ext uri="{909E8E84-426E-40DD-AFC4-6F175D3DCCD1}">
+                <a14:hiddenFill xmlns:a14="http://schemas.microsoft.com/office/drawing/2010/main">
+                  <a:solidFill>
+                    <a:srgbClr val="FFFFFF"/>
+                  </a:solidFill>
+                </a14:hiddenFill>
+              </a:ext>
+            </a:extLst>
+          </p:spPr>
+        </p:pic>
+        <p:pic>
+          <p:nvPicPr>
+            <p:cNvPr id="14" name="Picture 2" descr="C:\Users\wondory\Desktop\aaa.png"/>
+            <p:cNvPicPr>
+              <a:picLocks noChangeAspect="1" noChangeArrowheads="1"/>
+            </p:cNvPicPr>
+            <p:nvPr/>
+          </p:nvPicPr>
+          <p:blipFill>
+            <a:blip r:embed="rId6" cstate="print">
+              <a:extLst>
+                <a:ext uri="{28A0092B-C50C-407E-A947-70E740481C1C}">
+                  <a14:useLocalDpi xmlns:a14="http://schemas.microsoft.com/office/drawing/2010/main" val="0"/>
+                </a:ext>
+              </a:extLst>
+            </a:blip>
+            <a:srcRect/>
+            <a:stretch>
+              <a:fillRect/>
+            </a:stretch>
+          </p:blipFill>
+          <p:spPr bwMode="auto">
+            <a:xfrm>
+              <a:off x="10437132" y="4486815"/>
+              <a:ext cx="1071335" cy="1247494"/>
+            </a:xfrm>
+            <a:prstGeom prst="rect">
+              <a:avLst/>
+            </a:prstGeom>
+            <a:noFill/>
+            <a:extLst>
+              <a:ext uri="{909E8E84-426E-40DD-AFC4-6F175D3DCCD1}">
+                <a14:hiddenFill xmlns:a14="http://schemas.microsoft.com/office/drawing/2010/main">
+                  <a:solidFill>
+                    <a:srgbClr val="FFFFFF"/>
+                  </a:solidFill>
+                </a14:hiddenFill>
+              </a:ext>
+            </a:extLst>
+          </p:spPr>
+        </p:pic>
+      </p:grpSp>
+      <p:grpSp>
+        <p:nvGrpSpPr>
+          <p:cNvPr id="36" name="그룹 35"/>
+          <p:cNvGrpSpPr/>
+          <p:nvPr/>
+        </p:nvGrpSpPr>
+        <p:grpSpPr>
+          <a:xfrm>
+            <a:off x="7943413" y="1364814"/>
+            <a:ext cx="2479205" cy="677001"/>
+            <a:chOff x="6845747" y="2718857"/>
+            <a:chExt cx="4568375" cy="1247494"/>
+          </a:xfrm>
+        </p:grpSpPr>
+        <p:pic>
+          <p:nvPicPr>
+            <p:cNvPr id="37" name="Picture 2" descr="C:\Users\wondory\Desktop\aaa.png"/>
+            <p:cNvPicPr>
+              <a:picLocks noChangeAspect="1" noChangeArrowheads="1"/>
+            </p:cNvPicPr>
+            <p:nvPr/>
+          </p:nvPicPr>
+          <p:blipFill>
+            <a:blip r:embed="rId7" cstate="print">
+              <a:extLst>
+                <a:ext uri="{28A0092B-C50C-407E-A947-70E740481C1C}">
+                  <a14:useLocalDpi xmlns:a14="http://schemas.microsoft.com/office/drawing/2010/main" val="0"/>
+                </a:ext>
+              </a:extLst>
+            </a:blip>
+            <a:srcRect/>
+            <a:stretch>
+              <a:fillRect/>
+            </a:stretch>
+          </p:blipFill>
+          <p:spPr bwMode="auto">
+            <a:xfrm>
+              <a:off x="10342787" y="2718857"/>
+              <a:ext cx="1071335" cy="1247494"/>
+            </a:xfrm>
+            <a:prstGeom prst="rect">
+              <a:avLst/>
+            </a:prstGeom>
+            <a:noFill/>
+            <a:extLst>
+              <a:ext uri="{909E8E84-426E-40DD-AFC4-6F175D3DCCD1}">
+                <a14:hiddenFill xmlns:a14="http://schemas.microsoft.com/office/drawing/2010/main">
+                  <a:solidFill>
+                    <a:srgbClr val="FFFFFF"/>
+                  </a:solidFill>
+                </a14:hiddenFill>
+              </a:ext>
+            </a:extLst>
+          </p:spPr>
+        </p:pic>
+        <p:pic>
+          <p:nvPicPr>
+            <p:cNvPr id="38" name="Picture 2" descr="C:\Users\wondory\Desktop\aaa.png"/>
+            <p:cNvPicPr>
+              <a:picLocks noChangeAspect="1" noChangeArrowheads="1"/>
+            </p:cNvPicPr>
+            <p:nvPr/>
+          </p:nvPicPr>
+          <p:blipFill>
+            <a:blip r:embed="rId7" cstate="print">
+              <a:extLst>
+                <a:ext uri="{28A0092B-C50C-407E-A947-70E740481C1C}">
+                  <a14:useLocalDpi xmlns:a14="http://schemas.microsoft.com/office/drawing/2010/main" val="0"/>
+                </a:ext>
+              </a:extLst>
+            </a:blip>
+            <a:srcRect/>
+            <a:stretch>
+              <a:fillRect/>
+            </a:stretch>
+          </p:blipFill>
+          <p:spPr bwMode="auto">
+            <a:xfrm>
+              <a:off x="9177107" y="2718857"/>
+              <a:ext cx="1071335" cy="1247494"/>
+            </a:xfrm>
+            <a:prstGeom prst="rect">
+              <a:avLst/>
+            </a:prstGeom>
+            <a:noFill/>
+            <a:extLst>
+              <a:ext uri="{909E8E84-426E-40DD-AFC4-6F175D3DCCD1}">
+                <a14:hiddenFill xmlns:a14="http://schemas.microsoft.com/office/drawing/2010/main">
+                  <a:solidFill>
+                    <a:srgbClr val="FFFFFF"/>
+                  </a:solidFill>
+                </a14:hiddenFill>
+              </a:ext>
+            </a:extLst>
+          </p:spPr>
+        </p:pic>
+        <p:pic>
+          <p:nvPicPr>
+            <p:cNvPr id="39" name="Picture 2" descr="C:\Users\wondory\Desktop\aaa.png"/>
+            <p:cNvPicPr>
+              <a:picLocks noChangeAspect="1" noChangeArrowheads="1"/>
+            </p:cNvPicPr>
+            <p:nvPr/>
+          </p:nvPicPr>
+          <p:blipFill>
+            <a:blip r:embed="rId7" cstate="print">
+              <a:extLst>
+                <a:ext uri="{28A0092B-C50C-407E-A947-70E740481C1C}">
+                  <a14:useLocalDpi xmlns:a14="http://schemas.microsoft.com/office/drawing/2010/main" val="0"/>
+                </a:ext>
+              </a:extLst>
+            </a:blip>
+            <a:srcRect/>
+            <a:stretch>
+              <a:fillRect/>
+            </a:stretch>
+          </p:blipFill>
+          <p:spPr bwMode="auto">
+            <a:xfrm>
+              <a:off x="8011427" y="2718857"/>
+              <a:ext cx="1071335" cy="1247494"/>
+            </a:xfrm>
+            <a:prstGeom prst="rect">
+              <a:avLst/>
+            </a:prstGeom>
+            <a:noFill/>
+            <a:extLst>
+              <a:ext uri="{909E8E84-426E-40DD-AFC4-6F175D3DCCD1}">
+                <a14:hiddenFill xmlns:a14="http://schemas.microsoft.com/office/drawing/2010/main">
+                  <a:solidFill>
+                    <a:srgbClr val="FFFFFF"/>
+                  </a:solidFill>
+                </a14:hiddenFill>
+              </a:ext>
+            </a:extLst>
+          </p:spPr>
+        </p:pic>
+        <p:pic>
+          <p:nvPicPr>
+            <p:cNvPr id="40" name="Picture 2" descr="C:\Users\wondory\Desktop\aaa.png"/>
+            <p:cNvPicPr>
+              <a:picLocks noChangeAspect="1" noChangeArrowheads="1"/>
+            </p:cNvPicPr>
+            <p:nvPr/>
+          </p:nvPicPr>
+          <p:blipFill>
+            <a:blip r:embed="rId7" cstate="print">
+              <a:extLst>
+                <a:ext uri="{28A0092B-C50C-407E-A947-70E740481C1C}">
+                  <a14:useLocalDpi xmlns:a14="http://schemas.microsoft.com/office/drawing/2010/main" val="0"/>
+                </a:ext>
+              </a:extLst>
+            </a:blip>
+            <a:srcRect/>
+            <a:stretch>
+              <a:fillRect/>
+            </a:stretch>
+          </p:blipFill>
+          <p:spPr bwMode="auto">
+            <a:xfrm>
+              <a:off x="6845747" y="2718857"/>
+              <a:ext cx="1071335" cy="1247494"/>
+            </a:xfrm>
+            <a:prstGeom prst="rect">
+              <a:avLst/>
+            </a:prstGeom>
+            <a:noFill/>
+            <a:extLst>
+              <a:ext uri="{909E8E84-426E-40DD-AFC4-6F175D3DCCD1}">
+                <a14:hiddenFill xmlns:a14="http://schemas.microsoft.com/office/drawing/2010/main">
+                  <a:solidFill>
+                    <a:srgbClr val="FFFFFF"/>
+                  </a:solidFill>
+                </a14:hiddenFill>
+              </a:ext>
+            </a:extLst>
+          </p:spPr>
+        </p:pic>
+      </p:grpSp>
+    </p:spTree>
+    <p:extLst>
+      <p:ext uri="{BB962C8B-B14F-4D97-AF65-F5344CB8AC3E}">
+        <p14:creationId xmlns:p14="http://schemas.microsoft.com/office/powerpoint/2010/main" val="2925534751"/>
+      </p:ext>
+    </p:extLst>
+  </p:cSld>
+  <p:clrMapOvr>
+    <a:masterClrMapping/>
+  </p:clrMapOvr>
+  <p:timing>
+    <p:tnLst>
+      <p:par>
+        <p:cTn id="1" dur="indefinite" restart="never" nodeType="tmRoot"/>
+      </p:par>
+    </p:tnLst>
+  </p:timing>
+</p:sld>
+</file>
+
+<file path=ppt/slides/slide3.xml><?xml version="1.0" encoding="utf-8"?>
+<p:sld xmlns:a="http://schemas.openxmlformats.org/drawingml/2006/main" xmlns:r="http://schemas.openxmlformats.org/officeDocument/2006/relationships" xmlns:p="http://schemas.openxmlformats.org/presentationml/2006/main">
+  <p:cSld>
+    <p:spTree>
+      <p:nvGrpSpPr>
+        <p:cNvPr id="1" name=""/>
+        <p:cNvGrpSpPr/>
+        <p:nvPr/>
+      </p:nvGrpSpPr>
+      <p:grpSpPr>
+        <a:xfrm>
+          <a:off x="0" y="0"/>
+          <a:ext cx="0" cy="0"/>
+          <a:chOff x="0" y="0"/>
+          <a:chExt cx="0" cy="0"/>
+        </a:xfrm>
+      </p:grpSpPr>
+      <p:grpSp>
+        <p:nvGrpSpPr>
+          <p:cNvPr id="30" name="그룹 29"/>
+          <p:cNvGrpSpPr/>
+          <p:nvPr/>
+        </p:nvGrpSpPr>
+        <p:grpSpPr>
+          <a:xfrm>
+            <a:off x="7557746" y="1918592"/>
+            <a:ext cx="3238721" cy="884403"/>
+            <a:chOff x="6845747" y="2718857"/>
+            <a:chExt cx="4568375" cy="1247494"/>
+          </a:xfrm>
+        </p:grpSpPr>
+        <p:pic>
+          <p:nvPicPr>
+            <p:cNvPr id="31" name="Picture 2" descr="C:\Users\wondory\Desktop\aaa.png"/>
+            <p:cNvPicPr>
+              <a:picLocks noChangeAspect="1" noChangeArrowheads="1"/>
+            </p:cNvPicPr>
+            <p:nvPr/>
+          </p:nvPicPr>
+          <p:blipFill>
+            <a:blip r:embed="rId2" cstate="print">
+              <a:extLst>
+                <a:ext uri="{28A0092B-C50C-407E-A947-70E740481C1C}">
+                  <a14:useLocalDpi xmlns:a14="http://schemas.microsoft.com/office/drawing/2010/main" val="0"/>
+                </a:ext>
+              </a:extLst>
+            </a:blip>
+            <a:srcRect/>
+            <a:stretch>
+              <a:fillRect/>
+            </a:stretch>
+          </p:blipFill>
+          <p:spPr bwMode="auto">
+            <a:xfrm>
+              <a:off x="10342787" y="2718857"/>
+              <a:ext cx="1071335" cy="1247494"/>
+            </a:xfrm>
+            <a:prstGeom prst="rect">
+              <a:avLst/>
+            </a:prstGeom>
+            <a:noFill/>
+            <a:extLst>
+              <a:ext uri="{909E8E84-426E-40DD-AFC4-6F175D3DCCD1}">
+                <a14:hiddenFill xmlns:a14="http://schemas.microsoft.com/office/drawing/2010/main">
+                  <a:solidFill>
+                    <a:srgbClr val="FFFFFF"/>
+                  </a:solidFill>
+                </a14:hiddenFill>
+              </a:ext>
+            </a:extLst>
+          </p:spPr>
+        </p:pic>
+        <p:pic>
+          <p:nvPicPr>
+            <p:cNvPr id="32" name="Picture 2" descr="C:\Users\wondory\Desktop\aaa.png"/>
+            <p:cNvPicPr>
+              <a:picLocks noChangeAspect="1" noChangeArrowheads="1"/>
+            </p:cNvPicPr>
+            <p:nvPr/>
+          </p:nvPicPr>
+          <p:blipFill>
+            <a:blip r:embed="rId2" cstate="print">
+              <a:extLst>
+                <a:ext uri="{28A0092B-C50C-407E-A947-70E740481C1C}">
+                  <a14:useLocalDpi xmlns:a14="http://schemas.microsoft.com/office/drawing/2010/main" val="0"/>
+                </a:ext>
+              </a:extLst>
+            </a:blip>
+            <a:srcRect/>
+            <a:stretch>
+              <a:fillRect/>
+            </a:stretch>
+          </p:blipFill>
+          <p:spPr bwMode="auto">
+            <a:xfrm>
+              <a:off x="9177107" y="2718857"/>
+              <a:ext cx="1071335" cy="1247494"/>
+            </a:xfrm>
+            <a:prstGeom prst="rect">
+              <a:avLst/>
+            </a:prstGeom>
+            <a:noFill/>
+            <a:extLst>
+              <a:ext uri="{909E8E84-426E-40DD-AFC4-6F175D3DCCD1}">
+                <a14:hiddenFill xmlns:a14="http://schemas.microsoft.com/office/drawing/2010/main">
+                  <a:solidFill>
+                    <a:srgbClr val="FFFFFF"/>
+                  </a:solidFill>
+                </a14:hiddenFill>
+              </a:ext>
+            </a:extLst>
+          </p:spPr>
+        </p:pic>
+        <p:pic>
+          <p:nvPicPr>
+            <p:cNvPr id="33" name="Picture 2" descr="C:\Users\wondory\Desktop\aaa.png"/>
+            <p:cNvPicPr>
+              <a:picLocks noChangeAspect="1" noChangeArrowheads="1"/>
+            </p:cNvPicPr>
+            <p:nvPr/>
+          </p:nvPicPr>
+          <p:blipFill>
+            <a:blip r:embed="rId2" cstate="print">
+              <a:extLst>
+                <a:ext uri="{28A0092B-C50C-407E-A947-70E740481C1C}">
+                  <a14:useLocalDpi xmlns:a14="http://schemas.microsoft.com/office/drawing/2010/main" val="0"/>
+                </a:ext>
+              </a:extLst>
+            </a:blip>
+            <a:srcRect/>
+            <a:stretch>
+              <a:fillRect/>
+            </a:stretch>
+          </p:blipFill>
+          <p:spPr bwMode="auto">
+            <a:xfrm>
+              <a:off x="8011427" y="2718857"/>
+              <a:ext cx="1071335" cy="1247494"/>
+            </a:xfrm>
+            <a:prstGeom prst="rect">
+              <a:avLst/>
+            </a:prstGeom>
+            <a:noFill/>
+            <a:extLst>
+              <a:ext uri="{909E8E84-426E-40DD-AFC4-6F175D3DCCD1}">
+                <a14:hiddenFill xmlns:a14="http://schemas.microsoft.com/office/drawing/2010/main">
+                  <a:solidFill>
+                    <a:srgbClr val="FFFFFF"/>
+                  </a:solidFill>
+                </a14:hiddenFill>
+              </a:ext>
+            </a:extLst>
+          </p:spPr>
+        </p:pic>
+        <p:pic>
+          <p:nvPicPr>
+            <p:cNvPr id="34" name="Picture 2" descr="C:\Users\wondory\Desktop\aaa.png"/>
+            <p:cNvPicPr>
+              <a:picLocks noChangeAspect="1" noChangeArrowheads="1"/>
+            </p:cNvPicPr>
+            <p:nvPr/>
+          </p:nvPicPr>
+          <p:blipFill>
+            <a:blip r:embed="rId2" cstate="print">
+              <a:extLst>
+                <a:ext uri="{28A0092B-C50C-407E-A947-70E740481C1C}">
+                  <a14:useLocalDpi xmlns:a14="http://schemas.microsoft.com/office/drawing/2010/main" val="0"/>
+                </a:ext>
+              </a:extLst>
+            </a:blip>
+            <a:srcRect/>
+            <a:stretch>
+              <a:fillRect/>
+            </a:stretch>
+          </p:blipFill>
+          <p:spPr bwMode="auto">
+            <a:xfrm>
+              <a:off x="6845747" y="2718857"/>
+              <a:ext cx="1071335" cy="1247494"/>
+            </a:xfrm>
+            <a:prstGeom prst="rect">
+              <a:avLst/>
+            </a:prstGeom>
+            <a:noFill/>
+            <a:extLst>
+              <a:ext uri="{909E8E84-426E-40DD-AFC4-6F175D3DCCD1}">
+                <a14:hiddenFill xmlns:a14="http://schemas.microsoft.com/office/drawing/2010/main">
+                  <a:solidFill>
+                    <a:srgbClr val="FFFFFF"/>
+                  </a:solidFill>
+                </a14:hiddenFill>
+              </a:ext>
+            </a:extLst>
+          </p:spPr>
+        </p:pic>
+      </p:grpSp>
+      <p:grpSp>
+        <p:nvGrpSpPr>
+          <p:cNvPr id="29" name="그룹 28"/>
+          <p:cNvGrpSpPr/>
+          <p:nvPr/>
+        </p:nvGrpSpPr>
+        <p:grpSpPr>
+          <a:xfrm>
+            <a:off x="7244294" y="2970344"/>
+            <a:ext cx="3858517" cy="1053652"/>
+            <a:chOff x="6845747" y="2718857"/>
+            <a:chExt cx="4568375" cy="1247494"/>
+          </a:xfrm>
+        </p:grpSpPr>
+        <p:pic>
+          <p:nvPicPr>
+            <p:cNvPr id="25" name="Picture 2" descr="C:\Users\wondory\Desktop\aaa.png"/>
+            <p:cNvPicPr>
+              <a:picLocks noChangeAspect="1" noChangeArrowheads="1"/>
+            </p:cNvPicPr>
+            <p:nvPr/>
+          </p:nvPicPr>
+          <p:blipFill>
+            <a:blip r:embed="rId3" cstate="print">
+              <a:extLst>
+                <a:ext uri="{28A0092B-C50C-407E-A947-70E740481C1C}">
+                  <a14:useLocalDpi xmlns:a14="http://schemas.microsoft.com/office/drawing/2010/main" val="0"/>
+                </a:ext>
+              </a:extLst>
+            </a:blip>
+            <a:srcRect/>
+            <a:stretch>
+              <a:fillRect/>
+            </a:stretch>
+          </p:blipFill>
+          <p:spPr bwMode="auto">
+            <a:xfrm>
+              <a:off x="10342787" y="2718857"/>
+              <a:ext cx="1071335" cy="1247494"/>
+            </a:xfrm>
+            <a:prstGeom prst="rect">
+              <a:avLst/>
+            </a:prstGeom>
+            <a:noFill/>
+            <a:extLst>
+              <a:ext uri="{909E8E84-426E-40DD-AFC4-6F175D3DCCD1}">
+                <a14:hiddenFill xmlns:a14="http://schemas.microsoft.com/office/drawing/2010/main">
+                  <a:solidFill>
+                    <a:srgbClr val="FFFFFF"/>
+                  </a:solidFill>
+                </a14:hiddenFill>
+              </a:ext>
+            </a:extLst>
+          </p:spPr>
+        </p:pic>
+        <p:pic>
+          <p:nvPicPr>
+            <p:cNvPr id="26" name="Picture 2" descr="C:\Users\wondory\Desktop\aaa.png"/>
+            <p:cNvPicPr>
+              <a:picLocks noChangeAspect="1" noChangeArrowheads="1"/>
+            </p:cNvPicPr>
+            <p:nvPr/>
+          </p:nvPicPr>
+          <p:blipFill>
+            <a:blip r:embed="rId3" cstate="print">
+              <a:extLst>
+                <a:ext uri="{28A0092B-C50C-407E-A947-70E740481C1C}">
+                  <a14:useLocalDpi xmlns:a14="http://schemas.microsoft.com/office/drawing/2010/main" val="0"/>
+                </a:ext>
+              </a:extLst>
+            </a:blip>
+            <a:srcRect/>
+            <a:stretch>
+              <a:fillRect/>
+            </a:stretch>
+          </p:blipFill>
+          <p:spPr bwMode="auto">
+            <a:xfrm>
+              <a:off x="9177107" y="2718857"/>
+              <a:ext cx="1071335" cy="1247494"/>
+            </a:xfrm>
+            <a:prstGeom prst="rect">
+              <a:avLst/>
+            </a:prstGeom>
+            <a:noFill/>
+            <a:extLst>
+              <a:ext uri="{909E8E84-426E-40DD-AFC4-6F175D3DCCD1}">
+                <a14:hiddenFill xmlns:a14="http://schemas.microsoft.com/office/drawing/2010/main">
+                  <a:solidFill>
+                    <a:srgbClr val="FFFFFF"/>
+                  </a:solidFill>
+                </a14:hiddenFill>
+              </a:ext>
+            </a:extLst>
+          </p:spPr>
+        </p:pic>
+        <p:pic>
+          <p:nvPicPr>
+            <p:cNvPr id="27" name="Picture 2" descr="C:\Users\wondory\Desktop\aaa.png"/>
+            <p:cNvPicPr>
+              <a:picLocks noChangeAspect="1" noChangeArrowheads="1"/>
+            </p:cNvPicPr>
+            <p:nvPr/>
+          </p:nvPicPr>
+          <p:blipFill>
+            <a:blip r:embed="rId3" cstate="print">
+              <a:extLst>
+                <a:ext uri="{28A0092B-C50C-407E-A947-70E740481C1C}">
+                  <a14:useLocalDpi xmlns:a14="http://schemas.microsoft.com/office/drawing/2010/main" val="0"/>
+                </a:ext>
+              </a:extLst>
+            </a:blip>
+            <a:srcRect/>
+            <a:stretch>
+              <a:fillRect/>
+            </a:stretch>
+          </p:blipFill>
+          <p:spPr bwMode="auto">
+            <a:xfrm>
+              <a:off x="8011427" y="2718857"/>
+              <a:ext cx="1071335" cy="1247494"/>
+            </a:xfrm>
+            <a:prstGeom prst="rect">
+              <a:avLst/>
+            </a:prstGeom>
+            <a:noFill/>
+            <a:extLst>
+              <a:ext uri="{909E8E84-426E-40DD-AFC4-6F175D3DCCD1}">
+                <a14:hiddenFill xmlns:a14="http://schemas.microsoft.com/office/drawing/2010/main">
+                  <a:solidFill>
+                    <a:srgbClr val="FFFFFF"/>
+                  </a:solidFill>
+                </a14:hiddenFill>
+              </a:ext>
+            </a:extLst>
+          </p:spPr>
+        </p:pic>
+        <p:pic>
+          <p:nvPicPr>
+            <p:cNvPr id="28" name="Picture 2" descr="C:\Users\wondory\Desktop\aaa.png"/>
+            <p:cNvPicPr>
+              <a:picLocks noChangeAspect="1" noChangeArrowheads="1"/>
+            </p:cNvPicPr>
+            <p:nvPr/>
+          </p:nvPicPr>
+          <p:blipFill>
+            <a:blip r:embed="rId3" cstate="print">
+              <a:extLst>
+                <a:ext uri="{28A0092B-C50C-407E-A947-70E740481C1C}">
+                  <a14:useLocalDpi xmlns:a14="http://schemas.microsoft.com/office/drawing/2010/main" val="0"/>
+                </a:ext>
+              </a:extLst>
+            </a:blip>
+            <a:srcRect/>
+            <a:stretch>
+              <a:fillRect/>
+            </a:stretch>
+          </p:blipFill>
+          <p:spPr bwMode="auto">
+            <a:xfrm>
+              <a:off x="6845747" y="2718857"/>
+              <a:ext cx="1071335" cy="1247494"/>
+            </a:xfrm>
+            <a:prstGeom prst="rect">
+              <a:avLst/>
+            </a:prstGeom>
+            <a:noFill/>
+            <a:extLst>
+              <a:ext uri="{909E8E84-426E-40DD-AFC4-6F175D3DCCD1}">
+                <a14:hiddenFill xmlns:a14="http://schemas.microsoft.com/office/drawing/2010/main">
+                  <a:solidFill>
+                    <a:srgbClr val="FFFFFF"/>
+                  </a:solidFill>
+                </a14:hiddenFill>
+              </a:ext>
+            </a:extLst>
+          </p:spPr>
+        </p:pic>
+      </p:grpSp>
+      <p:grpSp>
+        <p:nvGrpSpPr>
+          <p:cNvPr id="35" name="그룹 34"/>
+          <p:cNvGrpSpPr/>
+          <p:nvPr/>
+        </p:nvGrpSpPr>
+        <p:grpSpPr>
+          <a:xfrm>
+            <a:off x="6940092" y="4199368"/>
+            <a:ext cx="4568375" cy="1247494"/>
+            <a:chOff x="6940092" y="4486815"/>
+            <a:chExt cx="4568375" cy="1247494"/>
+          </a:xfrm>
+        </p:grpSpPr>
+        <p:pic>
+          <p:nvPicPr>
+            <p:cNvPr id="15" name="Picture 2" descr="C:\Users\wondory\Desktop\aaa.png"/>
+            <p:cNvPicPr>
+              <a:picLocks noChangeAspect="1" noChangeArrowheads="1"/>
+            </p:cNvPicPr>
+            <p:nvPr/>
+          </p:nvPicPr>
+          <p:blipFill>
+            <a:blip r:embed="rId4" cstate="print">
+              <a:extLst>
+                <a:ext uri="{28A0092B-C50C-407E-A947-70E740481C1C}">
+                  <a14:useLocalDpi xmlns:a14="http://schemas.microsoft.com/office/drawing/2010/main" val="0"/>
+                </a:ext>
+              </a:extLst>
+            </a:blip>
+            <a:srcRect/>
+            <a:stretch>
+              <a:fillRect/>
+            </a:stretch>
+          </p:blipFill>
+          <p:spPr bwMode="auto">
+            <a:xfrm>
+              <a:off x="9271452" y="4486815"/>
+              <a:ext cx="1071335" cy="1247494"/>
+            </a:xfrm>
+            <a:prstGeom prst="rect">
+              <a:avLst/>
+            </a:prstGeom>
+            <a:noFill/>
+            <a:extLst>
+              <a:ext uri="{909E8E84-426E-40DD-AFC4-6F175D3DCCD1}">
+                <a14:hiddenFill xmlns:a14="http://schemas.microsoft.com/office/drawing/2010/main">
+                  <a:solidFill>
+                    <a:srgbClr val="FFFFFF"/>
+                  </a:solidFill>
+                </a14:hiddenFill>
+              </a:ext>
+            </a:extLst>
+          </p:spPr>
+        </p:pic>
+        <p:pic>
+          <p:nvPicPr>
+            <p:cNvPr id="16" name="Picture 2" descr="C:\Users\wondory\Desktop\aaa.png"/>
+            <p:cNvPicPr>
+              <a:picLocks noChangeAspect="1" noChangeArrowheads="1"/>
+            </p:cNvPicPr>
+            <p:nvPr/>
+          </p:nvPicPr>
+          <p:blipFill>
+            <a:blip r:embed="rId4" cstate="print">
+              <a:extLst>
+                <a:ext uri="{28A0092B-C50C-407E-A947-70E740481C1C}">
+                  <a14:useLocalDpi xmlns:a14="http://schemas.microsoft.com/office/drawing/2010/main" val="0"/>
+                </a:ext>
+              </a:extLst>
+            </a:blip>
+            <a:srcRect/>
+            <a:stretch>
+              <a:fillRect/>
+            </a:stretch>
+          </p:blipFill>
+          <p:spPr bwMode="auto">
+            <a:xfrm>
+              <a:off x="8105772" y="4486815"/>
+              <a:ext cx="1071335" cy="1247494"/>
+            </a:xfrm>
+            <a:prstGeom prst="rect">
+              <a:avLst/>
+            </a:prstGeom>
+            <a:noFill/>
+            <a:extLst>
+              <a:ext uri="{909E8E84-426E-40DD-AFC4-6F175D3DCCD1}">
+                <a14:hiddenFill xmlns:a14="http://schemas.microsoft.com/office/drawing/2010/main">
+                  <a:solidFill>
+                    <a:srgbClr val="FFFFFF"/>
+                  </a:solidFill>
+                </a14:hiddenFill>
+              </a:ext>
+            </a:extLst>
+          </p:spPr>
+        </p:pic>
+        <p:pic>
+          <p:nvPicPr>
+            <p:cNvPr id="17" name="Picture 2" descr="C:\Users\wondory\Desktop\aaa.png"/>
+            <p:cNvPicPr>
+              <a:picLocks noChangeAspect="1" noChangeArrowheads="1"/>
+            </p:cNvPicPr>
+            <p:nvPr/>
+          </p:nvPicPr>
+          <p:blipFill>
+            <a:blip r:embed="rId4" cstate="print">
+              <a:extLst>
+                <a:ext uri="{28A0092B-C50C-407E-A947-70E740481C1C}">
+                  <a14:useLocalDpi xmlns:a14="http://schemas.microsoft.com/office/drawing/2010/main" val="0"/>
+                </a:ext>
+              </a:extLst>
+            </a:blip>
+            <a:srcRect/>
+            <a:stretch>
+              <a:fillRect/>
+            </a:stretch>
+          </p:blipFill>
+          <p:spPr bwMode="auto">
+            <a:xfrm>
+              <a:off x="6940092" y="4486815"/>
+              <a:ext cx="1071335" cy="1247494"/>
+            </a:xfrm>
+            <a:prstGeom prst="rect">
+              <a:avLst/>
+            </a:prstGeom>
+            <a:noFill/>
+            <a:extLst>
+              <a:ext uri="{909E8E84-426E-40DD-AFC4-6F175D3DCCD1}">
+                <a14:hiddenFill xmlns:a14="http://schemas.microsoft.com/office/drawing/2010/main">
+                  <a:solidFill>
+                    <a:srgbClr val="FFFFFF"/>
+                  </a:solidFill>
+                </a14:hiddenFill>
+              </a:ext>
+            </a:extLst>
+          </p:spPr>
+        </p:pic>
+        <p:pic>
+          <p:nvPicPr>
+            <p:cNvPr id="14" name="Picture 2" descr="C:\Users\wondory\Desktop\aaa.png"/>
+            <p:cNvPicPr>
+              <a:picLocks noChangeAspect="1" noChangeArrowheads="1"/>
+            </p:cNvPicPr>
+            <p:nvPr/>
+          </p:nvPicPr>
+          <p:blipFill>
+            <a:blip r:embed="rId4" cstate="print">
+              <a:extLst>
+                <a:ext uri="{28A0092B-C50C-407E-A947-70E740481C1C}">
+                  <a14:useLocalDpi xmlns:a14="http://schemas.microsoft.com/office/drawing/2010/main" val="0"/>
+                </a:ext>
+              </a:extLst>
+            </a:blip>
+            <a:srcRect/>
+            <a:stretch>
+              <a:fillRect/>
+            </a:stretch>
+          </p:blipFill>
+          <p:spPr bwMode="auto">
+            <a:xfrm>
+              <a:off x="10437132" y="4486815"/>
+              <a:ext cx="1071335" cy="1247494"/>
+            </a:xfrm>
+            <a:prstGeom prst="rect">
+              <a:avLst/>
+            </a:prstGeom>
+            <a:noFill/>
+            <a:extLst>
+              <a:ext uri="{909E8E84-426E-40DD-AFC4-6F175D3DCCD1}">
+                <a14:hiddenFill xmlns:a14="http://schemas.microsoft.com/office/drawing/2010/main">
+                  <a:solidFill>
+                    <a:srgbClr val="FFFFFF"/>
+                  </a:solidFill>
+                </a14:hiddenFill>
+              </a:ext>
+            </a:extLst>
+          </p:spPr>
+        </p:pic>
+      </p:grpSp>
+      <p:pic>
+        <p:nvPicPr>
+          <p:cNvPr id="2050" name="Picture 2"/>
+          <p:cNvPicPr>
+            <a:picLocks noChangeAspect="1" noChangeArrowheads="1"/>
+          </p:cNvPicPr>
+          <p:nvPr/>
+        </p:nvPicPr>
+        <p:blipFill>
+          <a:blip r:embed="rId5">
+            <a:extLst>
+              <a:ext uri="{28A0092B-C50C-407E-A947-70E740481C1C}">
+                <a14:useLocalDpi xmlns:a14="http://schemas.microsoft.com/office/drawing/2010/main" val="0"/>
+              </a:ext>
+            </a:extLst>
+          </a:blip>
+          <a:srcRect/>
+          <a:stretch>
+            <a:fillRect/>
+          </a:stretch>
+        </p:blipFill>
+        <p:spPr bwMode="auto">
+          <a:xfrm>
+            <a:off x="945695" y="1360853"/>
+            <a:ext cx="4319587" cy="4648199"/>
+          </a:xfrm>
+          <a:prstGeom prst="rect">
+            <a:avLst/>
+          </a:prstGeom>
+          <a:noFill/>
+          <a:ln>
+            <a:noFill/>
+          </a:ln>
+          <a:extLst>
+            <a:ext uri="{909E8E84-426E-40DD-AFC4-6F175D3DCCD1}">
+              <a14:hiddenFill xmlns:a14="http://schemas.microsoft.com/office/drawing/2010/main">
+                <a:solidFill>
+                  <a:schemeClr val="accent1"/>
+                </a:solidFill>
+              </a14:hiddenFill>
+            </a:ext>
+            <a:ext uri="{91240B29-F687-4F45-9708-019B960494DF}">
+              <a14:hiddenLine xmlns:a14="http://schemas.microsoft.com/office/drawing/2010/main" w="9525">
+                <a:solidFill>
+                  <a:schemeClr val="tx1"/>
+                </a:solidFill>
+                <a:miter lim="800000"/>
+                <a:headEnd/>
+                <a:tailEnd/>
+              </a14:hiddenLine>
+            </a:ext>
+          </a:extLst>
+        </p:spPr>
+      </p:pic>
+    </p:spTree>
+    <p:extLst>
+      <p:ext uri="{BB962C8B-B14F-4D97-AF65-F5344CB8AC3E}">
+        <p14:creationId xmlns:p14="http://schemas.microsoft.com/office/powerpoint/2010/main" val="2093710951"/>
+      </p:ext>
+    </p:extLst>
+  </p:cSld>
+  <p:clrMapOvr>
+    <a:masterClrMapping/>
+  </p:clrMapOvr>
+  <p:timing>
+    <p:tnLst>
+      <p:par>
+        <p:cTn id="1" dur="indefinite" restart="never" nodeType="tmRoot"/>
+      </p:par>
+    </p:tnLst>
+  </p:timing>
+</p:sld>
+</file>
+
 <file path=ppt/theme/theme1.xml><?xml version="1.0" encoding="utf-8"?>
 <a:theme xmlns:a="http://schemas.openxmlformats.org/drawingml/2006/main" name="Office 테마">
   <a:themeElements>
@@ -4009,7 +5817,7 @@
   <a:extraClrSchemeLst/>
   <a:extLst>
     <a:ext uri="{05A4C25C-085E-4340-85A3-A5531E510DB2}">
-      <thm15:themeFamily xmlns:thm15="http://schemas.microsoft.com/office/thememl/2012/main" xmlns="" name="Office Theme" id="{62F939B6-93AF-4DB8-9C6B-D6C7DFDC589F}" vid="{4A3C46E8-61CC-4603-A589-7422A47A8E4A}"/>
+      <thm15:themeFamily xmlns="" xmlns:thm15="http://schemas.microsoft.com/office/thememl/2012/main" name="Office Theme" id="{62F939B6-93AF-4DB8-9C6B-D6C7DFDC589F}" vid="{4A3C46E8-61CC-4603-A589-7422A47A8E4A}"/>
     </a:ext>
   </a:extLst>
 </a:theme>

</xml_diff>